<commit_message>
Se anexa Diagrama fases
</commit_message>
<xml_diff>
--- a/Proyectos.pptx
+++ b/Proyectos.pptx
@@ -12871,6 +12871,480 @@
           </p:txBody>
         </p:sp>
       </p:grpSp>
+      <p:grpSp>
+        <p:nvGrpSpPr>
+          <p:cNvPr id="10" name="3 Grupo">
+            <a:extLst>
+              <a:ext uri="{FF2B5EF4-FFF2-40B4-BE49-F238E27FC236}">
+                <a16:creationId xmlns:a16="http://schemas.microsoft.com/office/drawing/2014/main" id="{08A6D28D-0276-4BF8-AF59-FA917EDE165F}"/>
+              </a:ext>
+            </a:extLst>
+          </p:cNvPr>
+          <p:cNvGrpSpPr/>
+          <p:nvPr/>
+        </p:nvGrpSpPr>
+        <p:grpSpPr>
+          <a:xfrm>
+            <a:off x="1516911" y="3704057"/>
+            <a:ext cx="8443103" cy="684738"/>
+            <a:chOff x="215516" y="5060800"/>
+            <a:chExt cx="8443103" cy="684738"/>
+          </a:xfrm>
+        </p:grpSpPr>
+        <p:sp>
+          <p:nvSpPr>
+            <p:cNvPr id="11" name="2 Rectángulo">
+              <a:extLst>
+                <a:ext uri="{FF2B5EF4-FFF2-40B4-BE49-F238E27FC236}">
+                  <a16:creationId xmlns:a16="http://schemas.microsoft.com/office/drawing/2014/main" id="{5C6A401B-B23B-4DF6-B339-2C081D69C518}"/>
+                </a:ext>
+              </a:extLst>
+            </p:cNvPr>
+            <p:cNvSpPr/>
+            <p:nvPr/>
+          </p:nvSpPr>
+          <p:spPr>
+            <a:xfrm>
+              <a:off x="215516" y="5060800"/>
+              <a:ext cx="1152128" cy="648072"/>
+            </a:xfrm>
+            <a:prstGeom prst="rect">
+              <a:avLst/>
+            </a:prstGeom>
+            <a:solidFill>
+              <a:schemeClr val="bg2">
+                <a:lumMod val="75000"/>
+              </a:schemeClr>
+            </a:solidFill>
+          </p:spPr>
+          <p:style>
+            <a:lnRef idx="2">
+              <a:schemeClr val="accent1">
+                <a:shade val="50000"/>
+              </a:schemeClr>
+            </a:lnRef>
+            <a:fillRef idx="1">
+              <a:schemeClr val="accent1"/>
+            </a:fillRef>
+            <a:effectRef idx="0">
+              <a:schemeClr val="accent1"/>
+            </a:effectRef>
+            <a:fontRef idx="minor">
+              <a:schemeClr val="lt1"/>
+            </a:fontRef>
+          </p:style>
+          <p:txBody>
+            <a:bodyPr rtlCol="0" anchor="ctr"/>
+            <a:lstStyle/>
+            <a:p>
+              <a:pPr algn="ctr"/>
+              <a:r>
+                <a:rPr lang="es-MX" sz="1200" b="1">
+                  <a:solidFill>
+                    <a:schemeClr val="tx1"/>
+                  </a:solidFill>
+                </a:rPr>
+                <a:t>Planeación</a:t>
+              </a:r>
+              <a:endParaRPr lang="es-MX" sz="1200" b="1" dirty="0">
+                <a:solidFill>
+                  <a:schemeClr val="tx1"/>
+                </a:solidFill>
+              </a:endParaRPr>
+            </a:p>
+          </p:txBody>
+        </p:sp>
+        <p:sp>
+          <p:nvSpPr>
+            <p:cNvPr id="12" name="4 Rectángulo">
+              <a:extLst>
+                <a:ext uri="{FF2B5EF4-FFF2-40B4-BE49-F238E27FC236}">
+                  <a16:creationId xmlns:a16="http://schemas.microsoft.com/office/drawing/2014/main" id="{CC5621C8-FCCD-4690-9AB6-1AAECF6F88E3}"/>
+                </a:ext>
+              </a:extLst>
+            </p:cNvPr>
+            <p:cNvSpPr/>
+            <p:nvPr/>
+          </p:nvSpPr>
+          <p:spPr>
+            <a:xfrm>
+              <a:off x="1889702" y="5097466"/>
+              <a:ext cx="1080120" cy="648072"/>
+            </a:xfrm>
+            <a:prstGeom prst="rect">
+              <a:avLst/>
+            </a:prstGeom>
+            <a:solidFill>
+              <a:schemeClr val="bg2">
+                <a:lumMod val="75000"/>
+              </a:schemeClr>
+            </a:solidFill>
+          </p:spPr>
+          <p:style>
+            <a:lnRef idx="2">
+              <a:schemeClr val="accent1">
+                <a:shade val="50000"/>
+              </a:schemeClr>
+            </a:lnRef>
+            <a:fillRef idx="1">
+              <a:schemeClr val="accent1"/>
+            </a:fillRef>
+            <a:effectRef idx="0">
+              <a:schemeClr val="accent1"/>
+            </a:effectRef>
+            <a:fontRef idx="minor">
+              <a:schemeClr val="lt1"/>
+            </a:fontRef>
+          </p:style>
+          <p:txBody>
+            <a:bodyPr rtlCol="0" anchor="ctr"/>
+            <a:lstStyle/>
+            <a:p>
+              <a:pPr algn="ctr"/>
+              <a:r>
+                <a:rPr lang="es-MX" sz="1200" b="1">
+                  <a:solidFill>
+                    <a:schemeClr val="tx1"/>
+                  </a:solidFill>
+                </a:rPr>
+                <a:t>Creación</a:t>
+              </a:r>
+              <a:r>
+                <a:rPr lang="es-MX" sz="1200">
+                  <a:solidFill>
+                    <a:schemeClr val="tx1"/>
+                  </a:solidFill>
+                </a:rPr>
+                <a:t> </a:t>
+              </a:r>
+              <a:r>
+                <a:rPr lang="es-MX" sz="1200" b="1" dirty="0">
+                  <a:solidFill>
+                    <a:schemeClr val="tx1"/>
+                  </a:solidFill>
+                </a:rPr>
+                <a:t>del</a:t>
+              </a:r>
+              <a:r>
+                <a:rPr lang="es-MX" sz="1200" dirty="0">
+                  <a:solidFill>
+                    <a:schemeClr val="tx1"/>
+                  </a:solidFill>
+                </a:rPr>
+                <a:t> </a:t>
+              </a:r>
+              <a:r>
+                <a:rPr lang="es-MX" sz="1200" b="1" dirty="0">
+                  <a:solidFill>
+                    <a:schemeClr val="tx1"/>
+                  </a:solidFill>
+                </a:rPr>
+                <a:t>Concepto</a:t>
+              </a:r>
+            </a:p>
+          </p:txBody>
+        </p:sp>
+        <p:sp>
+          <p:nvSpPr>
+            <p:cNvPr id="13" name="5 Rectángulo">
+              <a:extLst>
+                <a:ext uri="{FF2B5EF4-FFF2-40B4-BE49-F238E27FC236}">
+                  <a16:creationId xmlns:a16="http://schemas.microsoft.com/office/drawing/2014/main" id="{E661A442-9D86-4C62-AC4A-EF263700620C}"/>
+                </a:ext>
+              </a:extLst>
+            </p:cNvPr>
+            <p:cNvSpPr/>
+            <p:nvPr/>
+          </p:nvSpPr>
+          <p:spPr>
+            <a:xfrm>
+              <a:off x="3307277" y="5097466"/>
+              <a:ext cx="1224136" cy="648072"/>
+            </a:xfrm>
+            <a:prstGeom prst="rect">
+              <a:avLst/>
+            </a:prstGeom>
+            <a:solidFill>
+              <a:schemeClr val="bg2">
+                <a:lumMod val="75000"/>
+              </a:schemeClr>
+            </a:solidFill>
+          </p:spPr>
+          <p:style>
+            <a:lnRef idx="2">
+              <a:schemeClr val="accent1">
+                <a:shade val="50000"/>
+              </a:schemeClr>
+            </a:lnRef>
+            <a:fillRef idx="1">
+              <a:schemeClr val="accent1"/>
+            </a:fillRef>
+            <a:effectRef idx="0">
+              <a:schemeClr val="accent1"/>
+            </a:effectRef>
+            <a:fontRef idx="minor">
+              <a:schemeClr val="lt1"/>
+            </a:fontRef>
+          </p:style>
+          <p:txBody>
+            <a:bodyPr rtlCol="0" anchor="ctr"/>
+            <a:lstStyle/>
+            <a:p>
+              <a:pPr algn="ctr"/>
+              <a:r>
+                <a:rPr lang="es-MX" sz="1200" b="1">
+                  <a:solidFill>
+                    <a:schemeClr val="tx1"/>
+                  </a:solidFill>
+                </a:rPr>
+                <a:t>Desarrollo del Sistema</a:t>
+              </a:r>
+              <a:endParaRPr lang="es-MX" sz="1200" b="1" dirty="0">
+                <a:solidFill>
+                  <a:schemeClr val="tx1"/>
+                </a:solidFill>
+              </a:endParaRPr>
+            </a:p>
+          </p:txBody>
+        </p:sp>
+        <p:sp>
+          <p:nvSpPr>
+            <p:cNvPr id="14" name="6 Rectángulo">
+              <a:extLst>
+                <a:ext uri="{FF2B5EF4-FFF2-40B4-BE49-F238E27FC236}">
+                  <a16:creationId xmlns:a16="http://schemas.microsoft.com/office/drawing/2014/main" id="{38B7796F-8140-4D55-B194-7FE5C0275382}"/>
+                </a:ext>
+              </a:extLst>
+            </p:cNvPr>
+            <p:cNvSpPr/>
+            <p:nvPr/>
+          </p:nvSpPr>
+          <p:spPr>
+            <a:xfrm>
+              <a:off x="4779023" y="5097466"/>
+              <a:ext cx="1080120" cy="648072"/>
+            </a:xfrm>
+            <a:prstGeom prst="rect">
+              <a:avLst/>
+            </a:prstGeom>
+            <a:solidFill>
+              <a:schemeClr val="bg2">
+                <a:lumMod val="75000"/>
+              </a:schemeClr>
+            </a:solidFill>
+          </p:spPr>
+          <p:style>
+            <a:lnRef idx="2">
+              <a:schemeClr val="accent1">
+                <a:shade val="50000"/>
+              </a:schemeClr>
+            </a:lnRef>
+            <a:fillRef idx="1">
+              <a:schemeClr val="accent1"/>
+            </a:fillRef>
+            <a:effectRef idx="0">
+              <a:schemeClr val="accent1"/>
+            </a:effectRef>
+            <a:fontRef idx="minor">
+              <a:schemeClr val="lt1"/>
+            </a:fontRef>
+          </p:style>
+          <p:txBody>
+            <a:bodyPr rtlCol="0" anchor="ctr"/>
+            <a:lstStyle/>
+            <a:p>
+              <a:pPr algn="ctr"/>
+              <a:r>
+                <a:rPr lang="es-MX" sz="1200" b="1">
+                  <a:solidFill>
+                    <a:schemeClr val="tx1"/>
+                  </a:solidFill>
+                </a:rPr>
+                <a:t>Ingeniería de detalle</a:t>
+              </a:r>
+              <a:endParaRPr lang="es-MX" sz="1200" b="1" dirty="0">
+                <a:solidFill>
+                  <a:schemeClr val="tx1"/>
+                </a:solidFill>
+              </a:endParaRPr>
+            </a:p>
+          </p:txBody>
+        </p:sp>
+        <p:sp>
+          <p:nvSpPr>
+            <p:cNvPr id="15" name="7 Rectángulo">
+              <a:extLst>
+                <a:ext uri="{FF2B5EF4-FFF2-40B4-BE49-F238E27FC236}">
+                  <a16:creationId xmlns:a16="http://schemas.microsoft.com/office/drawing/2014/main" id="{642442FA-FAC0-425D-82FD-C0CB3A15041A}"/>
+                </a:ext>
+              </a:extLst>
+            </p:cNvPr>
+            <p:cNvSpPr/>
+            <p:nvPr/>
+          </p:nvSpPr>
+          <p:spPr>
+            <a:xfrm>
+              <a:off x="6106753" y="5097466"/>
+              <a:ext cx="1080120" cy="648072"/>
+            </a:xfrm>
+            <a:prstGeom prst="rect">
+              <a:avLst/>
+            </a:prstGeom>
+            <a:solidFill>
+              <a:schemeClr val="bg2">
+                <a:lumMod val="75000"/>
+              </a:schemeClr>
+            </a:solidFill>
+          </p:spPr>
+          <p:style>
+            <a:lnRef idx="2">
+              <a:schemeClr val="accent1">
+                <a:shade val="50000"/>
+              </a:schemeClr>
+            </a:lnRef>
+            <a:fillRef idx="1">
+              <a:schemeClr val="accent1"/>
+            </a:fillRef>
+            <a:effectRef idx="0">
+              <a:schemeClr val="accent1"/>
+            </a:effectRef>
+            <a:fontRef idx="minor">
+              <a:schemeClr val="lt1"/>
+            </a:fontRef>
+          </p:style>
+          <p:txBody>
+            <a:bodyPr rtlCol="0" anchor="ctr"/>
+            <a:lstStyle/>
+            <a:p>
+              <a:pPr algn="ctr"/>
+              <a:r>
+                <a:rPr lang="es-MX" sz="1200" b="1">
+                  <a:solidFill>
+                    <a:schemeClr val="tx1"/>
+                  </a:solidFill>
+                </a:rPr>
+                <a:t>Pruebas y Mejoras</a:t>
+              </a:r>
+              <a:endParaRPr lang="es-MX" sz="1200" b="1" dirty="0">
+                <a:solidFill>
+                  <a:schemeClr val="tx1"/>
+                </a:solidFill>
+              </a:endParaRPr>
+            </a:p>
+          </p:txBody>
+        </p:sp>
+        <p:sp>
+          <p:nvSpPr>
+            <p:cNvPr id="16" name="8 Rectángulo">
+              <a:extLst>
+                <a:ext uri="{FF2B5EF4-FFF2-40B4-BE49-F238E27FC236}">
+                  <a16:creationId xmlns:a16="http://schemas.microsoft.com/office/drawing/2014/main" id="{E319A2D6-8355-4F85-9595-7574C70AF5EA}"/>
+                </a:ext>
+              </a:extLst>
+            </p:cNvPr>
+            <p:cNvSpPr/>
+            <p:nvPr/>
+          </p:nvSpPr>
+          <p:spPr>
+            <a:xfrm>
+              <a:off x="7434483" y="5097466"/>
+              <a:ext cx="1224136" cy="648072"/>
+            </a:xfrm>
+            <a:prstGeom prst="rect">
+              <a:avLst/>
+            </a:prstGeom>
+            <a:solidFill>
+              <a:schemeClr val="bg2">
+                <a:lumMod val="75000"/>
+              </a:schemeClr>
+            </a:solidFill>
+          </p:spPr>
+          <p:style>
+            <a:lnRef idx="2">
+              <a:schemeClr val="accent1">
+                <a:shade val="50000"/>
+              </a:schemeClr>
+            </a:lnRef>
+            <a:fillRef idx="1">
+              <a:schemeClr val="accent1"/>
+            </a:fillRef>
+            <a:effectRef idx="0">
+              <a:schemeClr val="accent1"/>
+            </a:effectRef>
+            <a:fontRef idx="minor">
+              <a:schemeClr val="lt1"/>
+            </a:fontRef>
+          </p:style>
+          <p:txBody>
+            <a:bodyPr rtlCol="0" anchor="ctr"/>
+            <a:lstStyle/>
+            <a:p>
+              <a:pPr algn="ctr"/>
+              <a:r>
+                <a:rPr lang="es-MX" sz="1200" b="1">
+                  <a:solidFill>
+                    <a:schemeClr val="tx1"/>
+                  </a:solidFill>
+                </a:rPr>
+                <a:t>Arranque  de Producción</a:t>
+              </a:r>
+              <a:endParaRPr lang="es-MX" sz="1200" b="1" dirty="0">
+                <a:solidFill>
+                  <a:schemeClr val="tx1"/>
+                </a:solidFill>
+              </a:endParaRPr>
+            </a:p>
+          </p:txBody>
+        </p:sp>
+      </p:grpSp>
+      <p:sp>
+        <p:nvSpPr>
+          <p:cNvPr id="17" name="Rectángulo 16">
+            <a:extLst>
+              <a:ext uri="{FF2B5EF4-FFF2-40B4-BE49-F238E27FC236}">
+                <a16:creationId xmlns:a16="http://schemas.microsoft.com/office/drawing/2014/main" id="{DF1B367B-27C7-444B-A797-A6F9D3E99DDB}"/>
+              </a:ext>
+            </a:extLst>
+          </p:cNvPr>
+          <p:cNvSpPr/>
+          <p:nvPr/>
+        </p:nvSpPr>
+        <p:spPr>
+          <a:xfrm>
+            <a:off x="1177095" y="3319755"/>
+            <a:ext cx="9311425" cy="1416676"/>
+          </a:xfrm>
+          <a:prstGeom prst="rect">
+            <a:avLst/>
+          </a:prstGeom>
+          <a:noFill/>
+          <a:ln w="38100"/>
+        </p:spPr>
+        <p:style>
+          <a:lnRef idx="2">
+            <a:schemeClr val="accent1">
+              <a:shade val="50000"/>
+            </a:schemeClr>
+          </a:lnRef>
+          <a:fillRef idx="1">
+            <a:schemeClr val="accent1"/>
+          </a:fillRef>
+          <a:effectRef idx="0">
+            <a:schemeClr val="accent1"/>
+          </a:effectRef>
+          <a:fontRef idx="minor">
+            <a:schemeClr val="lt1"/>
+          </a:fontRef>
+        </p:style>
+        <p:txBody>
+          <a:bodyPr rtlCol="0" anchor="ctr"/>
+          <a:lstStyle/>
+          <a:p>
+            <a:pPr algn="ctr"/>
+            <a:endParaRPr lang="es-BO"/>
+          </a:p>
+        </p:txBody>
+      </p:sp>
     </p:spTree>
     <p:extLst>
       <p:ext uri="{BB962C8B-B14F-4D97-AF65-F5344CB8AC3E}">

</xml_diff>

<commit_message>
Se anexa Diagrama detalle
</commit_message>
<xml_diff>
--- a/Proyectos.pptx
+++ b/Proyectos.pptx
@@ -7,6 +7,7 @@
   <p:sldIdLst>
     <p:sldId id="256" r:id="rId2"/>
     <p:sldId id="257" r:id="rId3"/>
+    <p:sldId id="258" r:id="rId4"/>
   </p:sldIdLst>
   <p:sldSz cx="12192000" cy="6858000"/>
   <p:notesSz cx="6858000" cy="9144000"/>
@@ -163,7 +164,7 @@
           <a:noFill/>
           <a:extLst>
             <a:ext uri="{909E8E84-426E-40dd-AFC4-6F175D3DCCD1}">
-              <a14:hiddenFill xmlns="" xmlns:a14="http://schemas.microsoft.com/office/drawing/2010/main">
+              <a14:hiddenFill xmlns:a14="http://schemas.microsoft.com/office/drawing/2010/main" xmlns="">
                 <a:solidFill>
                   <a:srgbClr val="FFFFFF"/>
                 </a:solidFill>
@@ -223,7 +224,7 @@
             </a:ln>
             <a:extLst>
               <a:ext uri="{91240B29-F687-4f45-9708-019B960494DF}">
-                <a14:hiddenLine xmlns="" xmlns:a14="http://schemas.microsoft.com/office/drawing/2010/main" w="9525">
+                <a14:hiddenLine xmlns:a14="http://schemas.microsoft.com/office/drawing/2010/main" xmlns="" w="9525">
                   <a:solidFill>
                     <a:srgbClr val="000000"/>
                   </a:solidFill>
@@ -313,7 +314,7 @@
             </a:ln>
             <a:extLst>
               <a:ext uri="{91240B29-F687-4f45-9708-019B960494DF}">
-                <a14:hiddenLine xmlns="" xmlns:a14="http://schemas.microsoft.com/office/drawing/2010/main" w="9525">
+                <a14:hiddenLine xmlns:a14="http://schemas.microsoft.com/office/drawing/2010/main" xmlns="" w="9525">
                   <a:solidFill>
                     <a:srgbClr val="000000"/>
                   </a:solidFill>
@@ -403,7 +404,7 @@
             </a:ln>
             <a:extLst>
               <a:ext uri="{91240B29-F687-4f45-9708-019B960494DF}">
-                <a14:hiddenLine xmlns="" xmlns:a14="http://schemas.microsoft.com/office/drawing/2010/main" w="9525">
+                <a14:hiddenLine xmlns:a14="http://schemas.microsoft.com/office/drawing/2010/main" xmlns="" w="9525">
                   <a:solidFill>
                     <a:srgbClr val="000000"/>
                   </a:solidFill>
@@ -437,7 +438,7 @@
             </a:ln>
             <a:extLst>
               <a:ext uri="{91240B29-F687-4f45-9708-019B960494DF}">
-                <a14:hiddenLine xmlns="" xmlns:a14="http://schemas.microsoft.com/office/drawing/2010/main" w="9525">
+                <a14:hiddenLine xmlns:a14="http://schemas.microsoft.com/office/drawing/2010/main" xmlns="" w="9525">
                   <a:solidFill>
                     <a:srgbClr val="000000"/>
                   </a:solidFill>
@@ -527,7 +528,7 @@
             </a:ln>
             <a:extLst>
               <a:ext uri="{91240B29-F687-4f45-9708-019B960494DF}">
-                <a14:hiddenLine xmlns="" xmlns:a14="http://schemas.microsoft.com/office/drawing/2010/main" w="9525">
+                <a14:hiddenLine xmlns:a14="http://schemas.microsoft.com/office/drawing/2010/main" xmlns="" w="9525">
                   <a:solidFill>
                     <a:srgbClr val="000000"/>
                   </a:solidFill>
@@ -589,7 +590,7 @@
             </a:ln>
             <a:extLst>
               <a:ext uri="{91240B29-F687-4f45-9708-019B960494DF}">
-                <a14:hiddenLine xmlns="" xmlns:a14="http://schemas.microsoft.com/office/drawing/2010/main" w="9525">
+                <a14:hiddenLine xmlns:a14="http://schemas.microsoft.com/office/drawing/2010/main" xmlns="" w="9525">
                   <a:solidFill>
                     <a:srgbClr val="000000"/>
                   </a:solidFill>
@@ -651,7 +652,7 @@
             </a:ln>
             <a:extLst>
               <a:ext uri="{91240B29-F687-4f45-9708-019B960494DF}">
-                <a14:hiddenLine xmlns="" xmlns:a14="http://schemas.microsoft.com/office/drawing/2010/main" w="9525">
+                <a14:hiddenLine xmlns:a14="http://schemas.microsoft.com/office/drawing/2010/main" xmlns="" w="9525">
                   <a:solidFill>
                     <a:srgbClr val="000000"/>
                   </a:solidFill>
@@ -741,7 +742,7 @@
             </a:ln>
             <a:extLst>
               <a:ext uri="{91240B29-F687-4f45-9708-019B960494DF}">
-                <a14:hiddenLine xmlns="" xmlns:a14="http://schemas.microsoft.com/office/drawing/2010/main" w="9525">
+                <a14:hiddenLine xmlns:a14="http://schemas.microsoft.com/office/drawing/2010/main" xmlns="" w="9525">
                   <a:solidFill>
                     <a:srgbClr val="000000"/>
                   </a:solidFill>
@@ -803,7 +804,7 @@
             </a:ln>
             <a:extLst>
               <a:ext uri="{91240B29-F687-4f45-9708-019B960494DF}">
-                <a14:hiddenLine xmlns="" xmlns:a14="http://schemas.microsoft.com/office/drawing/2010/main" w="9525">
+                <a14:hiddenLine xmlns:a14="http://schemas.microsoft.com/office/drawing/2010/main" xmlns="" w="9525">
                   <a:solidFill>
                     <a:srgbClr val="000000"/>
                   </a:solidFill>
@@ -865,7 +866,7 @@
             </a:ln>
             <a:extLst>
               <a:ext uri="{91240B29-F687-4f45-9708-019B960494DF}">
-                <a14:hiddenLine xmlns="" xmlns:a14="http://schemas.microsoft.com/office/drawing/2010/main" w="9525">
+                <a14:hiddenLine xmlns:a14="http://schemas.microsoft.com/office/drawing/2010/main" xmlns="" w="9525">
                   <a:solidFill>
                     <a:srgbClr val="000000"/>
                   </a:solidFill>
@@ -955,7 +956,7 @@
             </a:ln>
             <a:extLst>
               <a:ext uri="{91240B29-F687-4f45-9708-019B960494DF}">
-                <a14:hiddenLine xmlns="" xmlns:a14="http://schemas.microsoft.com/office/drawing/2010/main" w="9525">
+                <a14:hiddenLine xmlns:a14="http://schemas.microsoft.com/office/drawing/2010/main" xmlns="" w="9525">
                   <a:solidFill>
                     <a:srgbClr val="000000"/>
                   </a:solidFill>
@@ -1045,7 +1046,7 @@
             </a:ln>
             <a:extLst>
               <a:ext uri="{91240B29-F687-4f45-9708-019B960494DF}">
-                <a14:hiddenLine xmlns="" xmlns:a14="http://schemas.microsoft.com/office/drawing/2010/main" w="9525">
+                <a14:hiddenLine xmlns:a14="http://schemas.microsoft.com/office/drawing/2010/main" xmlns="" w="9525">
                   <a:solidFill>
                     <a:srgbClr val="000000"/>
                   </a:solidFill>
@@ -1107,7 +1108,7 @@
             </a:ln>
             <a:extLst>
               <a:ext uri="{91240B29-F687-4f45-9708-019B960494DF}">
-                <a14:hiddenLine xmlns="" xmlns:a14="http://schemas.microsoft.com/office/drawing/2010/main" w="9525">
+                <a14:hiddenLine xmlns:a14="http://schemas.microsoft.com/office/drawing/2010/main" xmlns="" w="9525">
                   <a:solidFill>
                     <a:srgbClr val="000000"/>
                   </a:solidFill>
@@ -1217,7 +1218,7 @@
             </a:ln>
             <a:extLst>
               <a:ext uri="{91240B29-F687-4f45-9708-019B960494DF}">
-                <a14:hiddenLine xmlns="" xmlns:a14="http://schemas.microsoft.com/office/drawing/2010/main" w="9525">
+                <a14:hiddenLine xmlns:a14="http://schemas.microsoft.com/office/drawing/2010/main" xmlns="" w="9525">
                   <a:solidFill>
                     <a:srgbClr val="000000"/>
                   </a:solidFill>
@@ -1279,7 +1280,7 @@
             </a:ln>
             <a:extLst>
               <a:ext uri="{91240B29-F687-4f45-9708-019B960494DF}">
-                <a14:hiddenLine xmlns="" xmlns:a14="http://schemas.microsoft.com/office/drawing/2010/main" w="9525">
+                <a14:hiddenLine xmlns:a14="http://schemas.microsoft.com/office/drawing/2010/main" xmlns="" w="9525">
                   <a:solidFill>
                     <a:srgbClr val="000000"/>
                   </a:solidFill>
@@ -1369,7 +1370,7 @@
             </a:ln>
             <a:extLst>
               <a:ext uri="{91240B29-F687-4f45-9708-019B960494DF}">
-                <a14:hiddenLine xmlns="" xmlns:a14="http://schemas.microsoft.com/office/drawing/2010/main" w="9525">
+                <a14:hiddenLine xmlns:a14="http://schemas.microsoft.com/office/drawing/2010/main" xmlns="" w="9525">
                   <a:solidFill>
                     <a:srgbClr val="000000"/>
                   </a:solidFill>
@@ -1459,7 +1460,7 @@
             </a:ln>
             <a:extLst>
               <a:ext uri="{91240B29-F687-4f45-9708-019B960494DF}">
-                <a14:hiddenLine xmlns="" xmlns:a14="http://schemas.microsoft.com/office/drawing/2010/main" w="9525">
+                <a14:hiddenLine xmlns:a14="http://schemas.microsoft.com/office/drawing/2010/main" xmlns="" w="9525">
                   <a:solidFill>
                     <a:srgbClr val="000000"/>
                   </a:solidFill>
@@ -1521,7 +1522,7 @@
             </a:ln>
             <a:extLst>
               <a:ext uri="{91240B29-F687-4f45-9708-019B960494DF}">
-                <a14:hiddenLine xmlns="" xmlns:a14="http://schemas.microsoft.com/office/drawing/2010/main" w="9525">
+                <a14:hiddenLine xmlns:a14="http://schemas.microsoft.com/office/drawing/2010/main" xmlns="" w="9525">
                   <a:solidFill>
                     <a:srgbClr val="000000"/>
                   </a:solidFill>
@@ -1611,7 +1612,7 @@
             </a:ln>
             <a:extLst>
               <a:ext uri="{91240B29-F687-4f45-9708-019B960494DF}">
-                <a14:hiddenLine xmlns="" xmlns:a14="http://schemas.microsoft.com/office/drawing/2010/main" w="9525">
+                <a14:hiddenLine xmlns:a14="http://schemas.microsoft.com/office/drawing/2010/main" xmlns="" w="9525">
                   <a:solidFill>
                     <a:srgbClr val="000000"/>
                   </a:solidFill>
@@ -1701,7 +1702,7 @@
             </a:ln>
             <a:extLst>
               <a:ext uri="{91240B29-F687-4f45-9708-019B960494DF}">
-                <a14:hiddenLine xmlns="" xmlns:a14="http://schemas.microsoft.com/office/drawing/2010/main" w="9525">
+                <a14:hiddenLine xmlns:a14="http://schemas.microsoft.com/office/drawing/2010/main" xmlns="" w="9525">
                   <a:solidFill>
                     <a:srgbClr val="000000"/>
                   </a:solidFill>
@@ -1757,7 +1758,7 @@
             </a:ln>
             <a:extLst>
               <a:ext uri="{91240B29-F687-4f45-9708-019B960494DF}">
-                <a14:hiddenLine xmlns="" xmlns:a14="http://schemas.microsoft.com/office/drawing/2010/main" w="9525">
+                <a14:hiddenLine xmlns:a14="http://schemas.microsoft.com/office/drawing/2010/main" xmlns="" w="9525">
                   <a:solidFill>
                     <a:srgbClr val="000000"/>
                   </a:solidFill>
@@ -1847,7 +1848,7 @@
             </a:ln>
             <a:extLst>
               <a:ext uri="{91240B29-F687-4f45-9708-019B960494DF}">
-                <a14:hiddenLine xmlns="" xmlns:a14="http://schemas.microsoft.com/office/drawing/2010/main" w="9525">
+                <a14:hiddenLine xmlns:a14="http://schemas.microsoft.com/office/drawing/2010/main" xmlns="" w="9525">
                   <a:solidFill>
                     <a:srgbClr val="000000"/>
                   </a:solidFill>
@@ -1903,7 +1904,7 @@
             </a:ln>
             <a:extLst>
               <a:ext uri="{91240B29-F687-4f45-9708-019B960494DF}">
-                <a14:hiddenLine xmlns="" xmlns:a14="http://schemas.microsoft.com/office/drawing/2010/main" w="9525">
+                <a14:hiddenLine xmlns:a14="http://schemas.microsoft.com/office/drawing/2010/main" xmlns="" w="9525">
                   <a:solidFill>
                     <a:srgbClr val="000000"/>
                   </a:solidFill>
@@ -1993,7 +1994,7 @@
             </a:ln>
             <a:extLst>
               <a:ext uri="{91240B29-F687-4f45-9708-019B960494DF}">
-                <a14:hiddenLine xmlns="" xmlns:a14="http://schemas.microsoft.com/office/drawing/2010/main" w="9525">
+                <a14:hiddenLine xmlns:a14="http://schemas.microsoft.com/office/drawing/2010/main" xmlns="" w="9525">
                   <a:solidFill>
                     <a:srgbClr val="000000"/>
                   </a:solidFill>
@@ -2061,7 +2062,7 @@
             </a:ln>
             <a:extLst>
               <a:ext uri="{91240B29-F687-4f45-9708-019B960494DF}">
-                <a14:hiddenLine xmlns="" xmlns:a14="http://schemas.microsoft.com/office/drawing/2010/main" w="9525">
+                <a14:hiddenLine xmlns:a14="http://schemas.microsoft.com/office/drawing/2010/main" xmlns="" w="9525">
                   <a:solidFill>
                     <a:srgbClr val="000000"/>
                   </a:solidFill>
@@ -2151,7 +2152,7 @@
             </a:ln>
             <a:extLst>
               <a:ext uri="{91240B29-F687-4f45-9708-019B960494DF}">
-                <a14:hiddenLine xmlns="" xmlns:a14="http://schemas.microsoft.com/office/drawing/2010/main" w="9525">
+                <a14:hiddenLine xmlns:a14="http://schemas.microsoft.com/office/drawing/2010/main" xmlns="" w="9525">
                   <a:solidFill>
                     <a:srgbClr val="000000"/>
                   </a:solidFill>
@@ -2219,7 +2220,7 @@
             </a:ln>
             <a:extLst>
               <a:ext uri="{91240B29-F687-4f45-9708-019B960494DF}">
-                <a14:hiddenLine xmlns="" xmlns:a14="http://schemas.microsoft.com/office/drawing/2010/main" w="9525">
+                <a14:hiddenLine xmlns:a14="http://schemas.microsoft.com/office/drawing/2010/main" xmlns="" w="9525">
                   <a:solidFill>
                     <a:srgbClr val="000000"/>
                   </a:solidFill>
@@ -2309,7 +2310,7 @@
             </a:ln>
             <a:extLst>
               <a:ext uri="{91240B29-F687-4f45-9708-019B960494DF}">
-                <a14:hiddenLine xmlns="" xmlns:a14="http://schemas.microsoft.com/office/drawing/2010/main" w="9525">
+                <a14:hiddenLine xmlns:a14="http://schemas.microsoft.com/office/drawing/2010/main" xmlns="" w="9525">
                   <a:solidFill>
                     <a:srgbClr val="000000"/>
                   </a:solidFill>
@@ -2343,7 +2344,7 @@
             </a:ln>
             <a:extLst>
               <a:ext uri="{91240B29-F687-4f45-9708-019B960494DF}">
-                <a14:hiddenLine xmlns="" xmlns:a14="http://schemas.microsoft.com/office/drawing/2010/main" w="9525">
+                <a14:hiddenLine xmlns:a14="http://schemas.microsoft.com/office/drawing/2010/main" xmlns="" w="9525">
                   <a:solidFill>
                     <a:srgbClr val="000000"/>
                   </a:solidFill>
@@ -2433,7 +2434,7 @@
             </a:ln>
             <a:extLst>
               <a:ext uri="{91240B29-F687-4f45-9708-019B960494DF}">
-                <a14:hiddenLine xmlns="" xmlns:a14="http://schemas.microsoft.com/office/drawing/2010/main" w="9525">
+                <a14:hiddenLine xmlns:a14="http://schemas.microsoft.com/office/drawing/2010/main" xmlns="" w="9525">
                   <a:solidFill>
                     <a:srgbClr val="000000"/>
                   </a:solidFill>
@@ -2495,7 +2496,7 @@
             </a:ln>
             <a:extLst>
               <a:ext uri="{91240B29-F687-4f45-9708-019B960494DF}">
-                <a14:hiddenLine xmlns="" xmlns:a14="http://schemas.microsoft.com/office/drawing/2010/main" w="9525">
+                <a14:hiddenLine xmlns:a14="http://schemas.microsoft.com/office/drawing/2010/main" xmlns="" w="9525">
                   <a:solidFill>
                     <a:srgbClr val="000000"/>
                   </a:solidFill>
@@ -2557,7 +2558,7 @@
             </a:ln>
             <a:extLst>
               <a:ext uri="{91240B29-F687-4f45-9708-019B960494DF}">
-                <a14:hiddenLine xmlns="" xmlns:a14="http://schemas.microsoft.com/office/drawing/2010/main" w="9525">
+                <a14:hiddenLine xmlns:a14="http://schemas.microsoft.com/office/drawing/2010/main" xmlns="" w="9525">
                   <a:solidFill>
                     <a:srgbClr val="000000"/>
                   </a:solidFill>
@@ -2647,7 +2648,7 @@
             </a:ln>
             <a:extLst>
               <a:ext uri="{91240B29-F687-4f45-9708-019B960494DF}">
-                <a14:hiddenLine xmlns="" xmlns:a14="http://schemas.microsoft.com/office/drawing/2010/main" w="9525">
+                <a14:hiddenLine xmlns:a14="http://schemas.microsoft.com/office/drawing/2010/main" xmlns="" w="9525">
                   <a:solidFill>
                     <a:srgbClr val="000000"/>
                   </a:solidFill>
@@ -2715,7 +2716,7 @@
             </a:ln>
             <a:extLst>
               <a:ext uri="{91240B29-F687-4f45-9708-019B960494DF}">
-                <a14:hiddenLine xmlns="" xmlns:a14="http://schemas.microsoft.com/office/drawing/2010/main" w="9525">
+                <a14:hiddenLine xmlns:a14="http://schemas.microsoft.com/office/drawing/2010/main" xmlns="" w="9525">
                   <a:solidFill>
                     <a:srgbClr val="000000"/>
                   </a:solidFill>
@@ -2777,7 +2778,7 @@
             </a:ln>
             <a:extLst>
               <a:ext uri="{91240B29-F687-4f45-9708-019B960494DF}">
-                <a14:hiddenLine xmlns="" xmlns:a14="http://schemas.microsoft.com/office/drawing/2010/main" w="9525">
+                <a14:hiddenLine xmlns:a14="http://schemas.microsoft.com/office/drawing/2010/main" xmlns="" w="9525">
                   <a:solidFill>
                     <a:srgbClr val="000000"/>
                   </a:solidFill>
@@ -2867,7 +2868,7 @@
             </a:ln>
             <a:extLst>
               <a:ext uri="{91240B29-F687-4f45-9708-019B960494DF}">
-                <a14:hiddenLine xmlns="" xmlns:a14="http://schemas.microsoft.com/office/drawing/2010/main" w="9525">
+                <a14:hiddenLine xmlns:a14="http://schemas.microsoft.com/office/drawing/2010/main" xmlns="" w="9525">
                   <a:solidFill>
                     <a:srgbClr val="000000"/>
                   </a:solidFill>
@@ -2929,7 +2930,7 @@
             </a:ln>
             <a:extLst>
               <a:ext uri="{91240B29-F687-4f45-9708-019B960494DF}">
-                <a14:hiddenLine xmlns="" xmlns:a14="http://schemas.microsoft.com/office/drawing/2010/main" w="9525">
+                <a14:hiddenLine xmlns:a14="http://schemas.microsoft.com/office/drawing/2010/main" xmlns="" w="9525">
                   <a:solidFill>
                     <a:srgbClr val="000000"/>
                   </a:solidFill>
@@ -3019,7 +3020,7 @@
             </a:ln>
             <a:extLst>
               <a:ext uri="{91240B29-F687-4f45-9708-019B960494DF}">
-                <a14:hiddenLine xmlns="" xmlns:a14="http://schemas.microsoft.com/office/drawing/2010/main" w="9525">
+                <a14:hiddenLine xmlns:a14="http://schemas.microsoft.com/office/drawing/2010/main" xmlns="" w="9525">
                   <a:solidFill>
                     <a:srgbClr val="000000"/>
                   </a:solidFill>
@@ -3081,7 +3082,7 @@
             </a:ln>
             <a:extLst>
               <a:ext uri="{91240B29-F687-4f45-9708-019B960494DF}">
-                <a14:hiddenLine xmlns="" xmlns:a14="http://schemas.microsoft.com/office/drawing/2010/main" w="9525">
+                <a14:hiddenLine xmlns:a14="http://schemas.microsoft.com/office/drawing/2010/main" xmlns="" w="9525">
                   <a:solidFill>
                     <a:srgbClr val="000000"/>
                   </a:solidFill>
@@ -3171,7 +3172,7 @@
             </a:ln>
             <a:extLst>
               <a:ext uri="{91240B29-F687-4f45-9708-019B960494DF}">
-                <a14:hiddenLine xmlns="" xmlns:a14="http://schemas.microsoft.com/office/drawing/2010/main" w="9525">
+                <a14:hiddenLine xmlns:a14="http://schemas.microsoft.com/office/drawing/2010/main" xmlns="" w="9525">
                   <a:solidFill>
                     <a:srgbClr val="000000"/>
                   </a:solidFill>
@@ -3205,7 +3206,7 @@
             </a:ln>
             <a:extLst>
               <a:ext uri="{91240B29-F687-4f45-9708-019B960494DF}">
-                <a14:hiddenLine xmlns="" xmlns:a14="http://schemas.microsoft.com/office/drawing/2010/main" w="9525">
+                <a14:hiddenLine xmlns:a14="http://schemas.microsoft.com/office/drawing/2010/main" xmlns="" w="9525">
                   <a:solidFill>
                     <a:srgbClr val="000000"/>
                   </a:solidFill>
@@ -3270,7 +3271,7 @@
             </a:ln>
             <a:extLst>
               <a:ext uri="{91240B29-F687-4f45-9708-019B960494DF}">
-                <a14:hiddenLine xmlns="" xmlns:a14="http://schemas.microsoft.com/office/drawing/2010/main" w="9525">
+                <a14:hiddenLine xmlns:a14="http://schemas.microsoft.com/office/drawing/2010/main" xmlns="" w="9525">
                   <a:solidFill>
                     <a:srgbClr val="000000"/>
                   </a:solidFill>
@@ -3360,7 +3361,7 @@
             </a:ln>
             <a:extLst>
               <a:ext uri="{91240B29-F687-4f45-9708-019B960494DF}">
-                <a14:hiddenLine xmlns="" xmlns:a14="http://schemas.microsoft.com/office/drawing/2010/main" w="9525">
+                <a14:hiddenLine xmlns:a14="http://schemas.microsoft.com/office/drawing/2010/main" xmlns="" w="9525">
                   <a:solidFill>
                     <a:srgbClr val="000000"/>
                   </a:solidFill>
@@ -3422,7 +3423,7 @@
             </a:ln>
             <a:extLst>
               <a:ext uri="{91240B29-F687-4f45-9708-019B960494DF}">
-                <a14:hiddenLine xmlns="" xmlns:a14="http://schemas.microsoft.com/office/drawing/2010/main" w="9525">
+                <a14:hiddenLine xmlns:a14="http://schemas.microsoft.com/office/drawing/2010/main" xmlns="" w="9525">
                   <a:solidFill>
                     <a:srgbClr val="000000"/>
                   </a:solidFill>
@@ -3512,7 +3513,7 @@
             </a:ln>
             <a:extLst>
               <a:ext uri="{91240B29-F687-4f45-9708-019B960494DF}">
-                <a14:hiddenLine xmlns="" xmlns:a14="http://schemas.microsoft.com/office/drawing/2010/main" w="9525">
+                <a14:hiddenLine xmlns:a14="http://schemas.microsoft.com/office/drawing/2010/main" xmlns="" w="9525">
                   <a:solidFill>
                     <a:srgbClr val="000000"/>
                   </a:solidFill>
@@ -3602,7 +3603,7 @@
             </a:ln>
             <a:extLst>
               <a:ext uri="{91240B29-F687-4f45-9708-019B960494DF}">
-                <a14:hiddenLine xmlns="" xmlns:a14="http://schemas.microsoft.com/office/drawing/2010/main" w="9525">
+                <a14:hiddenLine xmlns:a14="http://schemas.microsoft.com/office/drawing/2010/main" xmlns="" w="9525">
                   <a:solidFill>
                     <a:srgbClr val="000000"/>
                   </a:solidFill>
@@ -3667,7 +3668,7 @@
             </a:ln>
             <a:extLst>
               <a:ext uri="{91240B29-F687-4f45-9708-019B960494DF}">
-                <a14:hiddenLine xmlns="" xmlns:a14="http://schemas.microsoft.com/office/drawing/2010/main" w="9525">
+                <a14:hiddenLine xmlns:a14="http://schemas.microsoft.com/office/drawing/2010/main" xmlns="" w="9525">
                   <a:solidFill>
                     <a:srgbClr val="000000"/>
                   </a:solidFill>
@@ -3729,7 +3730,7 @@
             </a:ln>
             <a:extLst>
               <a:ext uri="{91240B29-F687-4f45-9708-019B960494DF}">
-                <a14:hiddenLine xmlns="" xmlns:a14="http://schemas.microsoft.com/office/drawing/2010/main" w="9525">
+                <a14:hiddenLine xmlns:a14="http://schemas.microsoft.com/office/drawing/2010/main" xmlns="" w="9525">
                   <a:solidFill>
                     <a:srgbClr val="000000"/>
                   </a:solidFill>
@@ -3819,7 +3820,7 @@
             </a:ln>
             <a:extLst>
               <a:ext uri="{91240B29-F687-4f45-9708-019B960494DF}">
-                <a14:hiddenLine xmlns="" xmlns:a14="http://schemas.microsoft.com/office/drawing/2010/main" w="9525">
+                <a14:hiddenLine xmlns:a14="http://schemas.microsoft.com/office/drawing/2010/main" xmlns="" w="9525">
                   <a:solidFill>
                     <a:srgbClr val="000000"/>
                   </a:solidFill>
@@ -3909,7 +3910,7 @@
             </a:ln>
             <a:extLst>
               <a:ext uri="{91240B29-F687-4f45-9708-019B960494DF}">
-                <a14:hiddenLine xmlns="" xmlns:a14="http://schemas.microsoft.com/office/drawing/2010/main" w="9525">
+                <a14:hiddenLine xmlns:a14="http://schemas.microsoft.com/office/drawing/2010/main" xmlns="" w="9525">
                   <a:solidFill>
                     <a:srgbClr val="000000"/>
                   </a:solidFill>
@@ -3971,7 +3972,7 @@
             </a:ln>
             <a:extLst>
               <a:ext uri="{91240B29-F687-4f45-9708-019B960494DF}">
-                <a14:hiddenLine xmlns="" xmlns:a14="http://schemas.microsoft.com/office/drawing/2010/main" w="9525">
+                <a14:hiddenLine xmlns:a14="http://schemas.microsoft.com/office/drawing/2010/main" xmlns="" w="9525">
                   <a:solidFill>
                     <a:srgbClr val="000000"/>
                   </a:solidFill>
@@ -4091,7 +4092,7 @@
             </a:ln>
             <a:extLst>
               <a:ext uri="{91240B29-F687-4f45-9708-019B960494DF}">
-                <a14:hiddenLine xmlns="" xmlns:a14="http://schemas.microsoft.com/office/drawing/2010/main" w="9525">
+                <a14:hiddenLine xmlns:a14="http://schemas.microsoft.com/office/drawing/2010/main" xmlns="" w="9525">
                   <a:solidFill>
                     <a:srgbClr val="000000"/>
                   </a:solidFill>
@@ -4159,7 +4160,7 @@
             </a:ln>
             <a:extLst>
               <a:ext uri="{91240B29-F687-4f45-9708-019B960494DF}">
-                <a14:hiddenLine xmlns="" xmlns:a14="http://schemas.microsoft.com/office/drawing/2010/main" w="9525">
+                <a14:hiddenLine xmlns:a14="http://schemas.microsoft.com/office/drawing/2010/main" xmlns="" w="9525">
                   <a:solidFill>
                     <a:srgbClr val="000000"/>
                   </a:solidFill>
@@ -4249,7 +4250,7 @@
             </a:ln>
             <a:extLst>
               <a:ext uri="{91240B29-F687-4f45-9708-019B960494DF}">
-                <a14:hiddenLine xmlns="" xmlns:a14="http://schemas.microsoft.com/office/drawing/2010/main" w="9525">
+                <a14:hiddenLine xmlns:a14="http://schemas.microsoft.com/office/drawing/2010/main" xmlns="" w="9525">
                   <a:solidFill>
                     <a:srgbClr val="000000"/>
                   </a:solidFill>
@@ -4389,7 +4390,7 @@
           <a:p>
             <a:fld id="{48A87A34-81AB-432B-8DAE-1953F412C126}" type="datetimeFigureOut">
               <a:rPr lang="en-US" dirty="0"/>
-              <a:t>2/14/2020</a:t>
+              <a:t>2/15/2020</a:t>
             </a:fld>
             <a:endParaRPr lang="en-US" dirty="0"/>
           </a:p>
@@ -4651,7 +4652,7 @@
           <a:p>
             <a:fld id="{48A87A34-81AB-432B-8DAE-1953F412C126}" type="datetimeFigureOut">
               <a:rPr lang="en-US" dirty="0"/>
-              <a:t>2/14/2020</a:t>
+              <a:t>2/15/2020</a:t>
             </a:fld>
             <a:endParaRPr lang="en-US" dirty="0"/>
           </a:p>
@@ -4842,7 +4843,7 @@
           <a:p>
             <a:fld id="{48A87A34-81AB-432B-8DAE-1953F412C126}" type="datetimeFigureOut">
               <a:rPr lang="en-US" dirty="0"/>
-              <a:t>2/14/2020</a:t>
+              <a:t>2/15/2020</a:t>
             </a:fld>
             <a:endParaRPr lang="en-US" dirty="0"/>
           </a:p>
@@ -5100,7 +5101,7 @@
           <a:p>
             <a:fld id="{48A87A34-81AB-432B-8DAE-1953F412C126}" type="datetimeFigureOut">
               <a:rPr lang="en-US" dirty="0"/>
-              <a:t>2/14/2020</a:t>
+              <a:t>2/15/2020</a:t>
             </a:fld>
             <a:endParaRPr lang="en-US" dirty="0"/>
           </a:p>
@@ -5529,7 +5530,7 @@
           <a:p>
             <a:fld id="{48A87A34-81AB-432B-8DAE-1953F412C126}" type="datetimeFigureOut">
               <a:rPr lang="en-US" dirty="0"/>
-              <a:t>2/14/2020</a:t>
+              <a:t>2/15/2020</a:t>
             </a:fld>
             <a:endParaRPr lang="en-US" dirty="0"/>
           </a:p>
@@ -6070,7 +6071,7 @@
           <a:p>
             <a:fld id="{48A87A34-81AB-432B-8DAE-1953F412C126}" type="datetimeFigureOut">
               <a:rPr lang="en-US" dirty="0"/>
-              <a:t>2/14/2020</a:t>
+              <a:t>2/15/2020</a:t>
             </a:fld>
             <a:endParaRPr lang="en-US" dirty="0"/>
           </a:p>
@@ -6785,7 +6786,7 @@
           <a:p>
             <a:fld id="{48A87A34-81AB-432B-8DAE-1953F412C126}" type="datetimeFigureOut">
               <a:rPr lang="en-US" dirty="0"/>
-              <a:t>2/14/2020</a:t>
+              <a:t>2/15/2020</a:t>
             </a:fld>
             <a:endParaRPr lang="en-US" dirty="0"/>
           </a:p>
@@ -6950,7 +6951,7 @@
           <a:p>
             <a:fld id="{48A87A34-81AB-432B-8DAE-1953F412C126}" type="datetimeFigureOut">
               <a:rPr lang="en-US" dirty="0"/>
-              <a:t>2/14/2020</a:t>
+              <a:t>2/15/2020</a:t>
             </a:fld>
             <a:endParaRPr lang="en-US" dirty="0"/>
           </a:p>
@@ -7125,7 +7126,7 @@
           <a:p>
             <a:fld id="{48A87A34-81AB-432B-8DAE-1953F412C126}" type="datetimeFigureOut">
               <a:rPr lang="en-US" dirty="0"/>
-              <a:t>2/14/2020</a:t>
+              <a:t>2/15/2020</a:t>
             </a:fld>
             <a:endParaRPr lang="en-US" dirty="0"/>
           </a:p>
@@ -7290,7 +7291,7 @@
           <a:p>
             <a:fld id="{48A87A34-81AB-432B-8DAE-1953F412C126}" type="datetimeFigureOut">
               <a:rPr lang="en-US" dirty="0"/>
-              <a:t>2/14/2020</a:t>
+              <a:t>2/15/2020</a:t>
             </a:fld>
             <a:endParaRPr lang="en-US" dirty="0"/>
           </a:p>
@@ -7535,7 +7536,7 @@
           <a:p>
             <a:fld id="{48A87A34-81AB-432B-8DAE-1953F412C126}" type="datetimeFigureOut">
               <a:rPr lang="en-US" dirty="0"/>
-              <a:t>2/14/2020</a:t>
+              <a:t>2/15/2020</a:t>
             </a:fld>
             <a:endParaRPr lang="en-US" dirty="0"/>
           </a:p>
@@ -7762,7 +7763,7 @@
           <a:p>
             <a:fld id="{48A87A34-81AB-432B-8DAE-1953F412C126}" type="datetimeFigureOut">
               <a:rPr lang="en-US" dirty="0"/>
-              <a:t>2/14/2020</a:t>
+              <a:t>2/15/2020</a:t>
             </a:fld>
             <a:endParaRPr lang="en-US" dirty="0"/>
           </a:p>
@@ -8138,7 +8139,7 @@
           <a:p>
             <a:fld id="{48A87A34-81AB-432B-8DAE-1953F412C126}" type="datetimeFigureOut">
               <a:rPr lang="en-US" dirty="0"/>
-              <a:t>2/14/2020</a:t>
+              <a:t>2/15/2020</a:t>
             </a:fld>
             <a:endParaRPr lang="en-US" dirty="0"/>
           </a:p>
@@ -8251,7 +8252,7 @@
           <a:p>
             <a:fld id="{48A87A34-81AB-432B-8DAE-1953F412C126}" type="datetimeFigureOut">
               <a:rPr lang="en-US" dirty="0"/>
-              <a:t>2/14/2020</a:t>
+              <a:t>2/15/2020</a:t>
             </a:fld>
             <a:endParaRPr lang="en-US" dirty="0"/>
           </a:p>
@@ -8341,7 +8342,7 @@
           <a:p>
             <a:fld id="{48A87A34-81AB-432B-8DAE-1953F412C126}" type="datetimeFigureOut">
               <a:rPr lang="en-US" dirty="0"/>
-              <a:t>2/14/2020</a:t>
+              <a:t>2/15/2020</a:t>
             </a:fld>
             <a:endParaRPr lang="en-US" dirty="0"/>
           </a:p>
@@ -8585,7 +8586,7 @@
           <a:p>
             <a:fld id="{48A87A34-81AB-432B-8DAE-1953F412C126}" type="datetimeFigureOut">
               <a:rPr lang="en-US" dirty="0"/>
-              <a:t>2/14/2020</a:t>
+              <a:t>2/15/2020</a:t>
             </a:fld>
             <a:endParaRPr lang="en-US" dirty="0"/>
           </a:p>
@@ -8860,7 +8861,7 @@
           <a:p>
             <a:fld id="{48A87A34-81AB-432B-8DAE-1953F412C126}" type="datetimeFigureOut">
               <a:rPr lang="en-US" dirty="0"/>
-              <a:t>2/14/2020</a:t>
+              <a:t>2/15/2020</a:t>
             </a:fld>
             <a:endParaRPr lang="en-US" dirty="0"/>
           </a:p>
@@ -8971,7 +8972,7 @@
           <a:noFill/>
           <a:extLst>
             <a:ext uri="{909E8E84-426E-40dd-AFC4-6F175D3DCCD1}">
-              <a14:hiddenFill xmlns="" xmlns:a14="http://schemas.microsoft.com/office/drawing/2010/main">
+              <a14:hiddenFill xmlns:a14="http://schemas.microsoft.com/office/drawing/2010/main" xmlns="">
                 <a:solidFill>
                   <a:srgbClr val="FFFFFF"/>
                 </a:solidFill>
@@ -9045,7 +9046,7 @@
               </a:ln>
               <a:extLst>
                 <a:ext uri="{91240B29-F687-4f45-9708-019B960494DF}">
-                  <a14:hiddenLine xmlns="" xmlns:a14="http://schemas.microsoft.com/office/drawing/2010/main" w="9525">
+                  <a14:hiddenLine xmlns:a14="http://schemas.microsoft.com/office/drawing/2010/main" xmlns="" w="9525">
                     <a:solidFill>
                       <a:srgbClr val="000000"/>
                     </a:solidFill>
@@ -9135,7 +9136,7 @@
               </a:ln>
               <a:extLst>
                 <a:ext uri="{91240B29-F687-4f45-9708-019B960494DF}">
-                  <a14:hiddenLine xmlns="" xmlns:a14="http://schemas.microsoft.com/office/drawing/2010/main" w="9525">
+                  <a14:hiddenLine xmlns:a14="http://schemas.microsoft.com/office/drawing/2010/main" xmlns="" w="9525">
                     <a:solidFill>
                       <a:srgbClr val="000000"/>
                     </a:solidFill>
@@ -9225,7 +9226,7 @@
               </a:ln>
               <a:extLst>
                 <a:ext uri="{91240B29-F687-4f45-9708-019B960494DF}">
-                  <a14:hiddenLine xmlns="" xmlns:a14="http://schemas.microsoft.com/office/drawing/2010/main" w="9525">
+                  <a14:hiddenLine xmlns:a14="http://schemas.microsoft.com/office/drawing/2010/main" xmlns="" w="9525">
                     <a:solidFill>
                       <a:srgbClr val="000000"/>
                     </a:solidFill>
@@ -9287,7 +9288,7 @@
               </a:ln>
               <a:extLst>
                 <a:ext uri="{91240B29-F687-4f45-9708-019B960494DF}">
-                  <a14:hiddenLine xmlns="" xmlns:a14="http://schemas.microsoft.com/office/drawing/2010/main" w="9525">
+                  <a14:hiddenLine xmlns:a14="http://schemas.microsoft.com/office/drawing/2010/main" xmlns="" w="9525">
                     <a:solidFill>
                       <a:srgbClr val="000000"/>
                     </a:solidFill>
@@ -9377,7 +9378,7 @@
               </a:ln>
               <a:extLst>
                 <a:ext uri="{91240B29-F687-4f45-9708-019B960494DF}">
-                  <a14:hiddenLine xmlns="" xmlns:a14="http://schemas.microsoft.com/office/drawing/2010/main" w="9525">
+                  <a14:hiddenLine xmlns:a14="http://schemas.microsoft.com/office/drawing/2010/main" xmlns="" w="9525">
                     <a:solidFill>
                       <a:srgbClr val="000000"/>
                     </a:solidFill>
@@ -9439,7 +9440,7 @@
               </a:ln>
               <a:extLst>
                 <a:ext uri="{91240B29-F687-4f45-9708-019B960494DF}">
-                  <a14:hiddenLine xmlns="" xmlns:a14="http://schemas.microsoft.com/office/drawing/2010/main" w="9525">
+                  <a14:hiddenLine xmlns:a14="http://schemas.microsoft.com/office/drawing/2010/main" xmlns="" w="9525">
                     <a:solidFill>
                       <a:srgbClr val="000000"/>
                     </a:solidFill>
@@ -9501,7 +9502,7 @@
               </a:ln>
               <a:extLst>
                 <a:ext uri="{91240B29-F687-4f45-9708-019B960494DF}">
-                  <a14:hiddenLine xmlns="" xmlns:a14="http://schemas.microsoft.com/office/drawing/2010/main" w="9525">
+                  <a14:hiddenLine xmlns:a14="http://schemas.microsoft.com/office/drawing/2010/main" xmlns="" w="9525">
                     <a:solidFill>
                       <a:srgbClr val="000000"/>
                     </a:solidFill>
@@ -9591,7 +9592,7 @@
               </a:ln>
               <a:extLst>
                 <a:ext uri="{91240B29-F687-4f45-9708-019B960494DF}">
-                  <a14:hiddenLine xmlns="" xmlns:a14="http://schemas.microsoft.com/office/drawing/2010/main" w="9525">
+                  <a14:hiddenLine xmlns:a14="http://schemas.microsoft.com/office/drawing/2010/main" xmlns="" w="9525">
                     <a:solidFill>
                       <a:srgbClr val="000000"/>
                     </a:solidFill>
@@ -9681,7 +9682,7 @@
               </a:ln>
               <a:extLst>
                 <a:ext uri="{91240B29-F687-4f45-9708-019B960494DF}">
-                  <a14:hiddenLine xmlns="" xmlns:a14="http://schemas.microsoft.com/office/drawing/2010/main" w="9525">
+                  <a14:hiddenLine xmlns:a14="http://schemas.microsoft.com/office/drawing/2010/main" xmlns="" w="9525">
                     <a:solidFill>
                       <a:srgbClr val="000000"/>
                     </a:solidFill>
@@ -9743,7 +9744,7 @@
               </a:ln>
               <a:extLst>
                 <a:ext uri="{91240B29-F687-4f45-9708-019B960494DF}">
-                  <a14:hiddenLine xmlns="" xmlns:a14="http://schemas.microsoft.com/office/drawing/2010/main" w="9525">
+                  <a14:hiddenLine xmlns:a14="http://schemas.microsoft.com/office/drawing/2010/main" xmlns="" w="9525">
                     <a:solidFill>
                       <a:srgbClr val="000000"/>
                     </a:solidFill>
@@ -9853,7 +9854,7 @@
               </a:ln>
               <a:extLst>
                 <a:ext uri="{91240B29-F687-4f45-9708-019B960494DF}">
-                  <a14:hiddenLine xmlns="" xmlns:a14="http://schemas.microsoft.com/office/drawing/2010/main" w="9525">
+                  <a14:hiddenLine xmlns:a14="http://schemas.microsoft.com/office/drawing/2010/main" xmlns="" w="9525">
                     <a:solidFill>
                       <a:srgbClr val="000000"/>
                     </a:solidFill>
@@ -9937,7 +9938,7 @@
               </a:ln>
               <a:extLst>
                 <a:ext uri="{91240B29-F687-4f45-9708-019B960494DF}">
-                  <a14:hiddenLine xmlns="" xmlns:a14="http://schemas.microsoft.com/office/drawing/2010/main" w="9525">
+                  <a14:hiddenLine xmlns:a14="http://schemas.microsoft.com/office/drawing/2010/main" xmlns="" w="9525">
                     <a:solidFill>
                       <a:srgbClr val="000000"/>
                     </a:solidFill>
@@ -9999,7 +10000,7 @@
               </a:ln>
               <a:extLst>
                 <a:ext uri="{91240B29-F687-4f45-9708-019B960494DF}">
-                  <a14:hiddenLine xmlns="" xmlns:a14="http://schemas.microsoft.com/office/drawing/2010/main" w="9525">
+                  <a14:hiddenLine xmlns:a14="http://schemas.microsoft.com/office/drawing/2010/main" xmlns="" w="9525">
                     <a:solidFill>
                       <a:srgbClr val="000000"/>
                     </a:solidFill>
@@ -10061,7 +10062,7 @@
               </a:ln>
               <a:extLst>
                 <a:ext uri="{91240B29-F687-4f45-9708-019B960494DF}">
-                  <a14:hiddenLine xmlns="" xmlns:a14="http://schemas.microsoft.com/office/drawing/2010/main" w="9525">
+                  <a14:hiddenLine xmlns:a14="http://schemas.microsoft.com/office/drawing/2010/main" xmlns="" w="9525">
                     <a:solidFill>
                       <a:srgbClr val="000000"/>
                     </a:solidFill>
@@ -10151,7 +10152,7 @@
               </a:ln>
               <a:extLst>
                 <a:ext uri="{91240B29-F687-4f45-9708-019B960494DF}">
-                  <a14:hiddenLine xmlns="" xmlns:a14="http://schemas.microsoft.com/office/drawing/2010/main" w="9525">
+                  <a14:hiddenLine xmlns:a14="http://schemas.microsoft.com/office/drawing/2010/main" xmlns="" w="9525">
                     <a:solidFill>
                       <a:srgbClr val="000000"/>
                     </a:solidFill>
@@ -10185,7 +10186,7 @@
               </a:ln>
               <a:extLst>
                 <a:ext uri="{91240B29-F687-4f45-9708-019B960494DF}">
-                  <a14:hiddenLine xmlns="" xmlns:a14="http://schemas.microsoft.com/office/drawing/2010/main" w="9525">
+                  <a14:hiddenLine xmlns:a14="http://schemas.microsoft.com/office/drawing/2010/main" xmlns="" w="9525">
                     <a:solidFill>
                       <a:srgbClr val="000000"/>
                     </a:solidFill>
@@ -10250,7 +10251,7 @@
               </a:ln>
               <a:extLst>
                 <a:ext uri="{91240B29-F687-4f45-9708-019B960494DF}">
-                  <a14:hiddenLine xmlns="" xmlns:a14="http://schemas.microsoft.com/office/drawing/2010/main" w="9525">
+                  <a14:hiddenLine xmlns:a14="http://schemas.microsoft.com/office/drawing/2010/main" xmlns="" w="9525">
                     <a:solidFill>
                       <a:srgbClr val="000000"/>
                     </a:solidFill>
@@ -10340,7 +10341,7 @@
               </a:ln>
               <a:extLst>
                 <a:ext uri="{91240B29-F687-4f45-9708-019B960494DF}">
-                  <a14:hiddenLine xmlns="" xmlns:a14="http://schemas.microsoft.com/office/drawing/2010/main" w="9525">
+                  <a14:hiddenLine xmlns:a14="http://schemas.microsoft.com/office/drawing/2010/main" xmlns="" w="9525">
                     <a:solidFill>
                       <a:srgbClr val="000000"/>
                     </a:solidFill>
@@ -10402,7 +10403,7 @@
               </a:ln>
               <a:extLst>
                 <a:ext uri="{91240B29-F687-4f45-9708-019B960494DF}">
-                  <a14:hiddenLine xmlns="" xmlns:a14="http://schemas.microsoft.com/office/drawing/2010/main" w="9525">
+                  <a14:hiddenLine xmlns:a14="http://schemas.microsoft.com/office/drawing/2010/main" xmlns="" w="9525">
                     <a:solidFill>
                       <a:srgbClr val="000000"/>
                     </a:solidFill>
@@ -10492,7 +10493,7 @@
               </a:ln>
               <a:extLst>
                 <a:ext uri="{91240B29-F687-4f45-9708-019B960494DF}">
-                  <a14:hiddenLine xmlns="" xmlns:a14="http://schemas.microsoft.com/office/drawing/2010/main" w="9525">
+                  <a14:hiddenLine xmlns:a14="http://schemas.microsoft.com/office/drawing/2010/main" xmlns="" w="9525">
                     <a:solidFill>
                       <a:srgbClr val="000000"/>
                     </a:solidFill>
@@ -10557,7 +10558,7 @@
               </a:ln>
               <a:extLst>
                 <a:ext uri="{91240B29-F687-4f45-9708-019B960494DF}">
-                  <a14:hiddenLine xmlns="" xmlns:a14="http://schemas.microsoft.com/office/drawing/2010/main" w="9525">
+                  <a14:hiddenLine xmlns:a14="http://schemas.microsoft.com/office/drawing/2010/main" xmlns="" w="9525">
                     <a:solidFill>
                       <a:srgbClr val="000000"/>
                     </a:solidFill>
@@ -10619,7 +10620,7 @@
               </a:ln>
               <a:extLst>
                 <a:ext uri="{91240B29-F687-4f45-9708-019B960494DF}">
-                  <a14:hiddenLine xmlns="" xmlns:a14="http://schemas.microsoft.com/office/drawing/2010/main" w="9525">
+                  <a14:hiddenLine xmlns:a14="http://schemas.microsoft.com/office/drawing/2010/main" xmlns="" w="9525">
                     <a:solidFill>
                       <a:srgbClr val="000000"/>
                     </a:solidFill>
@@ -10709,7 +10710,7 @@
               </a:ln>
               <a:extLst>
                 <a:ext uri="{91240B29-F687-4f45-9708-019B960494DF}">
-                  <a14:hiddenLine xmlns="" xmlns:a14="http://schemas.microsoft.com/office/drawing/2010/main" w="9525">
+                  <a14:hiddenLine xmlns:a14="http://schemas.microsoft.com/office/drawing/2010/main" xmlns="" w="9525">
                     <a:solidFill>
                       <a:srgbClr val="000000"/>
                     </a:solidFill>
@@ -10799,7 +10800,7 @@
               </a:ln>
               <a:extLst>
                 <a:ext uri="{91240B29-F687-4f45-9708-019B960494DF}">
-                  <a14:hiddenLine xmlns="" xmlns:a14="http://schemas.microsoft.com/office/drawing/2010/main" w="9525">
+                  <a14:hiddenLine xmlns:a14="http://schemas.microsoft.com/office/drawing/2010/main" xmlns="" w="9525">
                     <a:solidFill>
                       <a:srgbClr val="000000"/>
                     </a:solidFill>
@@ -10864,7 +10865,7 @@
               </a:ln>
               <a:extLst>
                 <a:ext uri="{91240B29-F687-4f45-9708-019B960494DF}">
-                  <a14:hiddenLine xmlns="" xmlns:a14="http://schemas.microsoft.com/office/drawing/2010/main" w="9525">
+                  <a14:hiddenLine xmlns:a14="http://schemas.microsoft.com/office/drawing/2010/main" xmlns="" w="9525">
                     <a:solidFill>
                       <a:srgbClr val="000000"/>
                     </a:solidFill>
@@ -10984,7 +10985,7 @@
               </a:ln>
               <a:extLst>
                 <a:ext uri="{91240B29-F687-4f45-9708-019B960494DF}">
-                  <a14:hiddenLine xmlns="" xmlns:a14="http://schemas.microsoft.com/office/drawing/2010/main" w="9525">
+                  <a14:hiddenLine xmlns:a14="http://schemas.microsoft.com/office/drawing/2010/main" xmlns="" w="9525">
                     <a:solidFill>
                       <a:srgbClr val="000000"/>
                     </a:solidFill>
@@ -11082,7 +11083,7 @@
               </a:ln>
               <a:extLst>
                 <a:ext uri="{91240B29-F687-4f45-9708-019B960494DF}">
-                  <a14:hiddenLine xmlns="" xmlns:a14="http://schemas.microsoft.com/office/drawing/2010/main" w="9525">
+                  <a14:hiddenLine xmlns:a14="http://schemas.microsoft.com/office/drawing/2010/main" xmlns="" w="9525">
                     <a:solidFill>
                       <a:srgbClr val="000000"/>
                     </a:solidFill>
@@ -11197,7 +11198,7 @@
               </a:ln>
               <a:extLst>
                 <a:ext uri="{91240B29-F687-4f45-9708-019B960494DF}">
-                  <a14:hiddenLine xmlns="" xmlns:a14="http://schemas.microsoft.com/office/drawing/2010/main" w="9525">
+                  <a14:hiddenLine xmlns:a14="http://schemas.microsoft.com/office/drawing/2010/main" xmlns="" w="9525">
                     <a:solidFill>
                       <a:srgbClr val="000000"/>
                     </a:solidFill>
@@ -11287,7 +11288,7 @@
               </a:ln>
               <a:extLst>
                 <a:ext uri="{91240B29-F687-4f45-9708-019B960494DF}">
-                  <a14:hiddenLine xmlns="" xmlns:a14="http://schemas.microsoft.com/office/drawing/2010/main" w="9525">
+                  <a14:hiddenLine xmlns:a14="http://schemas.microsoft.com/office/drawing/2010/main" xmlns="" w="9525">
                     <a:solidFill>
                       <a:srgbClr val="000000"/>
                     </a:solidFill>
@@ -11352,7 +11353,7 @@
               </a:ln>
               <a:extLst>
                 <a:ext uri="{91240B29-F687-4f45-9708-019B960494DF}">
-                  <a14:hiddenLine xmlns="" xmlns:a14="http://schemas.microsoft.com/office/drawing/2010/main" w="9525">
+                  <a14:hiddenLine xmlns:a14="http://schemas.microsoft.com/office/drawing/2010/main" xmlns="" w="9525">
                     <a:solidFill>
                       <a:srgbClr val="000000"/>
                     </a:solidFill>
@@ -11442,7 +11443,7 @@
               </a:ln>
               <a:extLst>
                 <a:ext uri="{91240B29-F687-4f45-9708-019B960494DF}">
-                  <a14:hiddenLine xmlns="" xmlns:a14="http://schemas.microsoft.com/office/drawing/2010/main" w="9525">
+                  <a14:hiddenLine xmlns:a14="http://schemas.microsoft.com/office/drawing/2010/main" xmlns="" w="9525">
                     <a:solidFill>
                       <a:srgbClr val="000000"/>
                     </a:solidFill>
@@ -11510,7 +11511,7 @@
               </a:ln>
               <a:extLst>
                 <a:ext uri="{91240B29-F687-4f45-9708-019B960494DF}">
-                  <a14:hiddenLine xmlns="" xmlns:a14="http://schemas.microsoft.com/office/drawing/2010/main" w="9525">
+                  <a14:hiddenLine xmlns:a14="http://schemas.microsoft.com/office/drawing/2010/main" xmlns="" w="9525">
                     <a:solidFill>
                       <a:srgbClr val="000000"/>
                     </a:solidFill>
@@ -11600,7 +11601,7 @@
               </a:ln>
               <a:extLst>
                 <a:ext uri="{91240B29-F687-4f45-9708-019B960494DF}">
-                  <a14:hiddenLine xmlns="" xmlns:a14="http://schemas.microsoft.com/office/drawing/2010/main" w="9525">
+                  <a14:hiddenLine xmlns:a14="http://schemas.microsoft.com/office/drawing/2010/main" xmlns="" w="9525">
                     <a:solidFill>
                       <a:srgbClr val="000000"/>
                     </a:solidFill>
@@ -11668,7 +11669,7 @@
               </a:ln>
               <a:extLst>
                 <a:ext uri="{91240B29-F687-4f45-9708-019B960494DF}">
-                  <a14:hiddenLine xmlns="" xmlns:a14="http://schemas.microsoft.com/office/drawing/2010/main" w="9525">
+                  <a14:hiddenLine xmlns:a14="http://schemas.microsoft.com/office/drawing/2010/main" xmlns="" w="9525">
                     <a:solidFill>
                       <a:srgbClr val="000000"/>
                     </a:solidFill>
@@ -11758,7 +11759,7 @@
               </a:ln>
               <a:extLst>
                 <a:ext uri="{91240B29-F687-4f45-9708-019B960494DF}">
-                  <a14:hiddenLine xmlns="" xmlns:a14="http://schemas.microsoft.com/office/drawing/2010/main" w="9525">
+                  <a14:hiddenLine xmlns:a14="http://schemas.microsoft.com/office/drawing/2010/main" xmlns="" w="9525">
                     <a:solidFill>
                       <a:srgbClr val="000000"/>
                     </a:solidFill>
@@ -11792,7 +11793,7 @@
               </a:ln>
               <a:extLst>
                 <a:ext uri="{91240B29-F687-4f45-9708-019B960494DF}">
-                  <a14:hiddenLine xmlns="" xmlns:a14="http://schemas.microsoft.com/office/drawing/2010/main" w="9525">
+                  <a14:hiddenLine xmlns:a14="http://schemas.microsoft.com/office/drawing/2010/main" xmlns="" w="9525">
                     <a:solidFill>
                       <a:srgbClr val="000000"/>
                     </a:solidFill>
@@ -11933,7 +11934,7 @@
             <a:fld id="{48A87A34-81AB-432B-8DAE-1953F412C126}" type="datetimeFigureOut">
               <a:rPr lang="en-US" dirty="0"/>
               <a:pPr/>
-              <a:t>2/14/2020</a:t>
+              <a:t>2/15/2020</a:t>
             </a:fld>
             <a:endParaRPr lang="en-US" dirty="0"/>
           </a:p>
@@ -13358,6 +13359,963 @@
 </p:sld>
 </file>
 
+<file path=ppt/slides/slide3.xml><?xml version="1.0" encoding="utf-8"?>
+<p:sld xmlns:a="http://schemas.openxmlformats.org/drawingml/2006/main" xmlns:r="http://schemas.openxmlformats.org/officeDocument/2006/relationships" xmlns:p="http://schemas.openxmlformats.org/presentationml/2006/main">
+  <p:cSld>
+    <p:spTree>
+      <p:nvGrpSpPr>
+        <p:cNvPr id="1" name=""/>
+        <p:cNvGrpSpPr/>
+        <p:nvPr/>
+      </p:nvGrpSpPr>
+      <p:grpSpPr>
+        <a:xfrm>
+          <a:off x="0" y="0"/>
+          <a:ext cx="0" cy="0"/>
+          <a:chOff x="0" y="0"/>
+          <a:chExt cx="0" cy="0"/>
+        </a:xfrm>
+      </p:grpSpPr>
+      <p:sp>
+        <p:nvSpPr>
+          <p:cNvPr id="2" name="Título 1">
+            <a:extLst>
+              <a:ext uri="{FF2B5EF4-FFF2-40B4-BE49-F238E27FC236}">
+                <a16:creationId xmlns:a16="http://schemas.microsoft.com/office/drawing/2014/main" id="{3AB087F0-A998-4AC1-8BBE-B8EC633AB42B}"/>
+              </a:ext>
+            </a:extLst>
+          </p:cNvPr>
+          <p:cNvSpPr>
+            <a:spLocks noGrp="1"/>
+          </p:cNvSpPr>
+          <p:nvPr>
+            <p:ph type="title"/>
+          </p:nvPr>
+        </p:nvSpPr>
+        <p:spPr/>
+        <p:txBody>
+          <a:bodyPr/>
+          <a:lstStyle/>
+          <a:p>
+            <a:r>
+              <a:rPr lang="es-BO" dirty="0"/>
+              <a:t>Proceso del desarrollo del producto</a:t>
+            </a:r>
+          </a:p>
+        </p:txBody>
+      </p:sp>
+      <p:grpSp>
+        <p:nvGrpSpPr>
+          <p:cNvPr id="10" name="3 Grupo">
+            <a:extLst>
+              <a:ext uri="{FF2B5EF4-FFF2-40B4-BE49-F238E27FC236}">
+                <a16:creationId xmlns:a16="http://schemas.microsoft.com/office/drawing/2014/main" id="{08A6D28D-0276-4BF8-AF59-FA917EDE165F}"/>
+              </a:ext>
+            </a:extLst>
+          </p:cNvPr>
+          <p:cNvGrpSpPr/>
+          <p:nvPr/>
+        </p:nvGrpSpPr>
+        <p:grpSpPr>
+          <a:xfrm>
+            <a:off x="1481229" y="2481390"/>
+            <a:ext cx="8443103" cy="684738"/>
+            <a:chOff x="215516" y="5060800"/>
+            <a:chExt cx="8443103" cy="684738"/>
+          </a:xfrm>
+        </p:grpSpPr>
+        <p:sp>
+          <p:nvSpPr>
+            <p:cNvPr id="11" name="2 Rectángulo">
+              <a:extLst>
+                <a:ext uri="{FF2B5EF4-FFF2-40B4-BE49-F238E27FC236}">
+                  <a16:creationId xmlns:a16="http://schemas.microsoft.com/office/drawing/2014/main" id="{5C6A401B-B23B-4DF6-B339-2C081D69C518}"/>
+                </a:ext>
+              </a:extLst>
+            </p:cNvPr>
+            <p:cNvSpPr/>
+            <p:nvPr/>
+          </p:nvSpPr>
+          <p:spPr>
+            <a:xfrm>
+              <a:off x="215516" y="5060800"/>
+              <a:ext cx="1152128" cy="648072"/>
+            </a:xfrm>
+            <a:prstGeom prst="rect">
+              <a:avLst/>
+            </a:prstGeom>
+            <a:solidFill>
+              <a:schemeClr val="bg2">
+                <a:lumMod val="75000"/>
+              </a:schemeClr>
+            </a:solidFill>
+          </p:spPr>
+          <p:style>
+            <a:lnRef idx="2">
+              <a:schemeClr val="accent1">
+                <a:shade val="50000"/>
+              </a:schemeClr>
+            </a:lnRef>
+            <a:fillRef idx="1">
+              <a:schemeClr val="accent1"/>
+            </a:fillRef>
+            <a:effectRef idx="0">
+              <a:schemeClr val="accent1"/>
+            </a:effectRef>
+            <a:fontRef idx="minor">
+              <a:schemeClr val="lt1"/>
+            </a:fontRef>
+          </p:style>
+          <p:txBody>
+            <a:bodyPr rtlCol="0" anchor="ctr"/>
+            <a:lstStyle/>
+            <a:p>
+              <a:pPr algn="ctr"/>
+              <a:r>
+                <a:rPr lang="es-MX" sz="1200" b="1">
+                  <a:solidFill>
+                    <a:schemeClr val="tx1"/>
+                  </a:solidFill>
+                </a:rPr>
+                <a:t>Planeación</a:t>
+              </a:r>
+              <a:endParaRPr lang="es-MX" sz="1200" b="1" dirty="0">
+                <a:solidFill>
+                  <a:schemeClr val="tx1"/>
+                </a:solidFill>
+              </a:endParaRPr>
+            </a:p>
+          </p:txBody>
+        </p:sp>
+        <p:sp>
+          <p:nvSpPr>
+            <p:cNvPr id="12" name="4 Rectángulo">
+              <a:extLst>
+                <a:ext uri="{FF2B5EF4-FFF2-40B4-BE49-F238E27FC236}">
+                  <a16:creationId xmlns:a16="http://schemas.microsoft.com/office/drawing/2014/main" id="{CC5621C8-FCCD-4690-9AB6-1AAECF6F88E3}"/>
+                </a:ext>
+              </a:extLst>
+            </p:cNvPr>
+            <p:cNvSpPr/>
+            <p:nvPr/>
+          </p:nvSpPr>
+          <p:spPr>
+            <a:xfrm>
+              <a:off x="1889702" y="5097466"/>
+              <a:ext cx="1080120" cy="648072"/>
+            </a:xfrm>
+            <a:prstGeom prst="rect">
+              <a:avLst/>
+            </a:prstGeom>
+            <a:solidFill>
+              <a:schemeClr val="bg2">
+                <a:lumMod val="75000"/>
+              </a:schemeClr>
+            </a:solidFill>
+          </p:spPr>
+          <p:style>
+            <a:lnRef idx="2">
+              <a:schemeClr val="accent1">
+                <a:shade val="50000"/>
+              </a:schemeClr>
+            </a:lnRef>
+            <a:fillRef idx="1">
+              <a:schemeClr val="accent1"/>
+            </a:fillRef>
+            <a:effectRef idx="0">
+              <a:schemeClr val="accent1"/>
+            </a:effectRef>
+            <a:fontRef idx="minor">
+              <a:schemeClr val="lt1"/>
+            </a:fontRef>
+          </p:style>
+          <p:txBody>
+            <a:bodyPr rtlCol="0" anchor="ctr"/>
+            <a:lstStyle/>
+            <a:p>
+              <a:pPr algn="ctr"/>
+              <a:r>
+                <a:rPr lang="es-MX" sz="1200" b="1">
+                  <a:solidFill>
+                    <a:schemeClr val="tx1"/>
+                  </a:solidFill>
+                </a:rPr>
+                <a:t>Creación</a:t>
+              </a:r>
+              <a:r>
+                <a:rPr lang="es-MX" sz="1200">
+                  <a:solidFill>
+                    <a:schemeClr val="tx1"/>
+                  </a:solidFill>
+                </a:rPr>
+                <a:t> </a:t>
+              </a:r>
+              <a:r>
+                <a:rPr lang="es-MX" sz="1200" b="1" dirty="0">
+                  <a:solidFill>
+                    <a:schemeClr val="tx1"/>
+                  </a:solidFill>
+                </a:rPr>
+                <a:t>del</a:t>
+              </a:r>
+              <a:r>
+                <a:rPr lang="es-MX" sz="1200" dirty="0">
+                  <a:solidFill>
+                    <a:schemeClr val="tx1"/>
+                  </a:solidFill>
+                </a:rPr>
+                <a:t> </a:t>
+              </a:r>
+              <a:r>
+                <a:rPr lang="es-MX" sz="1200" b="1" dirty="0">
+                  <a:solidFill>
+                    <a:schemeClr val="tx1"/>
+                  </a:solidFill>
+                </a:rPr>
+                <a:t>Concepto</a:t>
+              </a:r>
+            </a:p>
+          </p:txBody>
+        </p:sp>
+        <p:sp>
+          <p:nvSpPr>
+            <p:cNvPr id="13" name="5 Rectángulo">
+              <a:extLst>
+                <a:ext uri="{FF2B5EF4-FFF2-40B4-BE49-F238E27FC236}">
+                  <a16:creationId xmlns:a16="http://schemas.microsoft.com/office/drawing/2014/main" id="{E661A442-9D86-4C62-AC4A-EF263700620C}"/>
+                </a:ext>
+              </a:extLst>
+            </p:cNvPr>
+            <p:cNvSpPr/>
+            <p:nvPr/>
+          </p:nvSpPr>
+          <p:spPr>
+            <a:xfrm>
+              <a:off x="3307277" y="5097466"/>
+              <a:ext cx="1224136" cy="648072"/>
+            </a:xfrm>
+            <a:prstGeom prst="rect">
+              <a:avLst/>
+            </a:prstGeom>
+            <a:solidFill>
+              <a:schemeClr val="bg2">
+                <a:lumMod val="75000"/>
+              </a:schemeClr>
+            </a:solidFill>
+          </p:spPr>
+          <p:style>
+            <a:lnRef idx="2">
+              <a:schemeClr val="accent1">
+                <a:shade val="50000"/>
+              </a:schemeClr>
+            </a:lnRef>
+            <a:fillRef idx="1">
+              <a:schemeClr val="accent1"/>
+            </a:fillRef>
+            <a:effectRef idx="0">
+              <a:schemeClr val="accent1"/>
+            </a:effectRef>
+            <a:fontRef idx="minor">
+              <a:schemeClr val="lt1"/>
+            </a:fontRef>
+          </p:style>
+          <p:txBody>
+            <a:bodyPr rtlCol="0" anchor="ctr"/>
+            <a:lstStyle/>
+            <a:p>
+              <a:pPr algn="ctr"/>
+              <a:r>
+                <a:rPr lang="es-MX" sz="1200" b="1">
+                  <a:solidFill>
+                    <a:schemeClr val="tx1"/>
+                  </a:solidFill>
+                </a:rPr>
+                <a:t>Desarrollo del Sistema</a:t>
+              </a:r>
+              <a:endParaRPr lang="es-MX" sz="1200" b="1" dirty="0">
+                <a:solidFill>
+                  <a:schemeClr val="tx1"/>
+                </a:solidFill>
+              </a:endParaRPr>
+            </a:p>
+          </p:txBody>
+        </p:sp>
+        <p:sp>
+          <p:nvSpPr>
+            <p:cNvPr id="14" name="6 Rectángulo">
+              <a:extLst>
+                <a:ext uri="{FF2B5EF4-FFF2-40B4-BE49-F238E27FC236}">
+                  <a16:creationId xmlns:a16="http://schemas.microsoft.com/office/drawing/2014/main" id="{38B7796F-8140-4D55-B194-7FE5C0275382}"/>
+                </a:ext>
+              </a:extLst>
+            </p:cNvPr>
+            <p:cNvSpPr/>
+            <p:nvPr/>
+          </p:nvSpPr>
+          <p:spPr>
+            <a:xfrm>
+              <a:off x="4779023" y="5097466"/>
+              <a:ext cx="1080120" cy="648072"/>
+            </a:xfrm>
+            <a:prstGeom prst="rect">
+              <a:avLst/>
+            </a:prstGeom>
+            <a:solidFill>
+              <a:schemeClr val="bg2">
+                <a:lumMod val="75000"/>
+              </a:schemeClr>
+            </a:solidFill>
+          </p:spPr>
+          <p:style>
+            <a:lnRef idx="2">
+              <a:schemeClr val="accent1">
+                <a:shade val="50000"/>
+              </a:schemeClr>
+            </a:lnRef>
+            <a:fillRef idx="1">
+              <a:schemeClr val="accent1"/>
+            </a:fillRef>
+            <a:effectRef idx="0">
+              <a:schemeClr val="accent1"/>
+            </a:effectRef>
+            <a:fontRef idx="minor">
+              <a:schemeClr val="lt1"/>
+            </a:fontRef>
+          </p:style>
+          <p:txBody>
+            <a:bodyPr rtlCol="0" anchor="ctr"/>
+            <a:lstStyle/>
+            <a:p>
+              <a:pPr algn="ctr"/>
+              <a:r>
+                <a:rPr lang="es-MX" sz="1200" b="1">
+                  <a:solidFill>
+                    <a:schemeClr val="tx1"/>
+                  </a:solidFill>
+                </a:rPr>
+                <a:t>Ingeniería de detalle</a:t>
+              </a:r>
+              <a:endParaRPr lang="es-MX" sz="1200" b="1" dirty="0">
+                <a:solidFill>
+                  <a:schemeClr val="tx1"/>
+                </a:solidFill>
+              </a:endParaRPr>
+            </a:p>
+          </p:txBody>
+        </p:sp>
+        <p:sp>
+          <p:nvSpPr>
+            <p:cNvPr id="15" name="7 Rectángulo">
+              <a:extLst>
+                <a:ext uri="{FF2B5EF4-FFF2-40B4-BE49-F238E27FC236}">
+                  <a16:creationId xmlns:a16="http://schemas.microsoft.com/office/drawing/2014/main" id="{642442FA-FAC0-425D-82FD-C0CB3A15041A}"/>
+                </a:ext>
+              </a:extLst>
+            </p:cNvPr>
+            <p:cNvSpPr/>
+            <p:nvPr/>
+          </p:nvSpPr>
+          <p:spPr>
+            <a:xfrm>
+              <a:off x="6106753" y="5097466"/>
+              <a:ext cx="1080120" cy="648072"/>
+            </a:xfrm>
+            <a:prstGeom prst="rect">
+              <a:avLst/>
+            </a:prstGeom>
+            <a:solidFill>
+              <a:schemeClr val="bg2">
+                <a:lumMod val="75000"/>
+              </a:schemeClr>
+            </a:solidFill>
+          </p:spPr>
+          <p:style>
+            <a:lnRef idx="2">
+              <a:schemeClr val="accent1">
+                <a:shade val="50000"/>
+              </a:schemeClr>
+            </a:lnRef>
+            <a:fillRef idx="1">
+              <a:schemeClr val="accent1"/>
+            </a:fillRef>
+            <a:effectRef idx="0">
+              <a:schemeClr val="accent1"/>
+            </a:effectRef>
+            <a:fontRef idx="minor">
+              <a:schemeClr val="lt1"/>
+            </a:fontRef>
+          </p:style>
+          <p:txBody>
+            <a:bodyPr rtlCol="0" anchor="ctr"/>
+            <a:lstStyle/>
+            <a:p>
+              <a:pPr algn="ctr"/>
+              <a:r>
+                <a:rPr lang="es-MX" sz="1200" b="1">
+                  <a:solidFill>
+                    <a:schemeClr val="tx1"/>
+                  </a:solidFill>
+                </a:rPr>
+                <a:t>Pruebas y Mejoras</a:t>
+              </a:r>
+              <a:endParaRPr lang="es-MX" sz="1200" b="1" dirty="0">
+                <a:solidFill>
+                  <a:schemeClr val="tx1"/>
+                </a:solidFill>
+              </a:endParaRPr>
+            </a:p>
+          </p:txBody>
+        </p:sp>
+        <p:sp>
+          <p:nvSpPr>
+            <p:cNvPr id="16" name="8 Rectángulo">
+              <a:extLst>
+                <a:ext uri="{FF2B5EF4-FFF2-40B4-BE49-F238E27FC236}">
+                  <a16:creationId xmlns:a16="http://schemas.microsoft.com/office/drawing/2014/main" id="{E319A2D6-8355-4F85-9595-7574C70AF5EA}"/>
+                </a:ext>
+              </a:extLst>
+            </p:cNvPr>
+            <p:cNvSpPr/>
+            <p:nvPr/>
+          </p:nvSpPr>
+          <p:spPr>
+            <a:xfrm>
+              <a:off x="7434483" y="5097466"/>
+              <a:ext cx="1224136" cy="648072"/>
+            </a:xfrm>
+            <a:prstGeom prst="rect">
+              <a:avLst/>
+            </a:prstGeom>
+            <a:solidFill>
+              <a:schemeClr val="bg2">
+                <a:lumMod val="75000"/>
+              </a:schemeClr>
+            </a:solidFill>
+          </p:spPr>
+          <p:style>
+            <a:lnRef idx="2">
+              <a:schemeClr val="accent1">
+                <a:shade val="50000"/>
+              </a:schemeClr>
+            </a:lnRef>
+            <a:fillRef idx="1">
+              <a:schemeClr val="accent1"/>
+            </a:fillRef>
+            <a:effectRef idx="0">
+              <a:schemeClr val="accent1"/>
+            </a:effectRef>
+            <a:fontRef idx="minor">
+              <a:schemeClr val="lt1"/>
+            </a:fontRef>
+          </p:style>
+          <p:txBody>
+            <a:bodyPr rtlCol="0" anchor="ctr"/>
+            <a:lstStyle/>
+            <a:p>
+              <a:pPr algn="ctr"/>
+              <a:r>
+                <a:rPr lang="es-MX" sz="1200" b="1">
+                  <a:solidFill>
+                    <a:schemeClr val="tx1"/>
+                  </a:solidFill>
+                </a:rPr>
+                <a:t>Arranque  de Producción</a:t>
+              </a:r>
+              <a:endParaRPr lang="es-MX" sz="1200" b="1" dirty="0">
+                <a:solidFill>
+                  <a:schemeClr val="tx1"/>
+                </a:solidFill>
+              </a:endParaRPr>
+            </a:p>
+          </p:txBody>
+        </p:sp>
+      </p:grpSp>
+      <p:sp>
+        <p:nvSpPr>
+          <p:cNvPr id="17" name="Rectángulo 16">
+            <a:extLst>
+              <a:ext uri="{FF2B5EF4-FFF2-40B4-BE49-F238E27FC236}">
+                <a16:creationId xmlns:a16="http://schemas.microsoft.com/office/drawing/2014/main" id="{DF1B367B-27C7-444B-A797-A6F9D3E99DDB}"/>
+              </a:ext>
+            </a:extLst>
+          </p:cNvPr>
+          <p:cNvSpPr/>
+          <p:nvPr/>
+        </p:nvSpPr>
+        <p:spPr>
+          <a:xfrm>
+            <a:off x="1141413" y="2097088"/>
+            <a:ext cx="9311425" cy="1416676"/>
+          </a:xfrm>
+          <a:prstGeom prst="rect">
+            <a:avLst/>
+          </a:prstGeom>
+          <a:noFill/>
+          <a:ln w="38100"/>
+        </p:spPr>
+        <p:style>
+          <a:lnRef idx="2">
+            <a:schemeClr val="accent1">
+              <a:shade val="50000"/>
+            </a:schemeClr>
+          </a:lnRef>
+          <a:fillRef idx="1">
+            <a:schemeClr val="accent1"/>
+          </a:fillRef>
+          <a:effectRef idx="0">
+            <a:schemeClr val="accent1"/>
+          </a:effectRef>
+          <a:fontRef idx="minor">
+            <a:schemeClr val="lt1"/>
+          </a:fontRef>
+        </p:style>
+        <p:txBody>
+          <a:bodyPr rtlCol="0" anchor="ctr"/>
+          <a:lstStyle/>
+          <a:p>
+            <a:pPr algn="ctr"/>
+            <a:endParaRPr lang="es-BO"/>
+          </a:p>
+        </p:txBody>
+      </p:sp>
+      <p:grpSp>
+        <p:nvGrpSpPr>
+          <p:cNvPr id="18" name="3 Grupo">
+            <a:extLst>
+              <a:ext uri="{FF2B5EF4-FFF2-40B4-BE49-F238E27FC236}">
+                <a16:creationId xmlns:a16="http://schemas.microsoft.com/office/drawing/2014/main" id="{D1497BEF-08E4-4385-A6A9-853EEB591FCF}"/>
+              </a:ext>
+            </a:extLst>
+          </p:cNvPr>
+          <p:cNvGrpSpPr/>
+          <p:nvPr/>
+        </p:nvGrpSpPr>
+        <p:grpSpPr>
+          <a:xfrm>
+            <a:off x="1481229" y="3898066"/>
+            <a:ext cx="8443103" cy="684738"/>
+            <a:chOff x="215516" y="5060800"/>
+            <a:chExt cx="8443103" cy="684738"/>
+          </a:xfrm>
+        </p:grpSpPr>
+        <p:sp>
+          <p:nvSpPr>
+            <p:cNvPr id="19" name="2 Rectángulo">
+              <a:extLst>
+                <a:ext uri="{FF2B5EF4-FFF2-40B4-BE49-F238E27FC236}">
+                  <a16:creationId xmlns:a16="http://schemas.microsoft.com/office/drawing/2014/main" id="{12A509AE-F01E-40C9-AA2A-C61EFA5CEB84}"/>
+                </a:ext>
+              </a:extLst>
+            </p:cNvPr>
+            <p:cNvSpPr/>
+            <p:nvPr/>
+          </p:nvSpPr>
+          <p:spPr>
+            <a:xfrm>
+              <a:off x="215516" y="5060800"/>
+              <a:ext cx="1152128" cy="648072"/>
+            </a:xfrm>
+            <a:prstGeom prst="rect">
+              <a:avLst/>
+            </a:prstGeom>
+            <a:solidFill>
+              <a:schemeClr val="bg2">
+                <a:lumMod val="75000"/>
+              </a:schemeClr>
+            </a:solidFill>
+          </p:spPr>
+          <p:style>
+            <a:lnRef idx="2">
+              <a:schemeClr val="accent1">
+                <a:shade val="50000"/>
+              </a:schemeClr>
+            </a:lnRef>
+            <a:fillRef idx="1">
+              <a:schemeClr val="accent1"/>
+            </a:fillRef>
+            <a:effectRef idx="0">
+              <a:schemeClr val="accent1"/>
+            </a:effectRef>
+            <a:fontRef idx="minor">
+              <a:schemeClr val="lt1"/>
+            </a:fontRef>
+          </p:style>
+          <p:txBody>
+            <a:bodyPr rtlCol="0" anchor="ctr"/>
+            <a:lstStyle/>
+            <a:p>
+              <a:pPr algn="ctr"/>
+              <a:r>
+                <a:rPr lang="es-MX" sz="1200" b="1" dirty="0">
+                  <a:solidFill>
+                    <a:schemeClr val="tx1"/>
+                  </a:solidFill>
+                </a:rPr>
+                <a:t>Planificación      del   Producto</a:t>
+              </a:r>
+            </a:p>
+          </p:txBody>
+        </p:sp>
+        <p:sp>
+          <p:nvSpPr>
+            <p:cNvPr id="20" name="4 Rectángulo">
+              <a:extLst>
+                <a:ext uri="{FF2B5EF4-FFF2-40B4-BE49-F238E27FC236}">
+                  <a16:creationId xmlns:a16="http://schemas.microsoft.com/office/drawing/2014/main" id="{7028171C-4564-429C-9CEA-95A2A44FD03B}"/>
+                </a:ext>
+              </a:extLst>
+            </p:cNvPr>
+            <p:cNvSpPr/>
+            <p:nvPr/>
+          </p:nvSpPr>
+          <p:spPr>
+            <a:xfrm>
+              <a:off x="1889702" y="5097466"/>
+              <a:ext cx="1080120" cy="648072"/>
+            </a:xfrm>
+            <a:prstGeom prst="rect">
+              <a:avLst/>
+            </a:prstGeom>
+            <a:solidFill>
+              <a:schemeClr val="bg2">
+                <a:lumMod val="75000"/>
+              </a:schemeClr>
+            </a:solidFill>
+          </p:spPr>
+          <p:style>
+            <a:lnRef idx="2">
+              <a:schemeClr val="accent1">
+                <a:shade val="50000"/>
+              </a:schemeClr>
+            </a:lnRef>
+            <a:fillRef idx="1">
+              <a:schemeClr val="accent1"/>
+            </a:fillRef>
+            <a:effectRef idx="0">
+              <a:schemeClr val="accent1"/>
+            </a:effectRef>
+            <a:fontRef idx="minor">
+              <a:schemeClr val="lt1"/>
+            </a:fontRef>
+          </p:style>
+          <p:txBody>
+            <a:bodyPr rtlCol="0" anchor="ctr"/>
+            <a:lstStyle/>
+            <a:p>
+              <a:pPr algn="ctr"/>
+              <a:r>
+                <a:rPr lang="es-MX" sz="1200" b="1" dirty="0">
+                  <a:solidFill>
+                    <a:schemeClr val="tx1"/>
+                  </a:solidFill>
+                </a:rPr>
+                <a:t>Generación</a:t>
+              </a:r>
+              <a:r>
+                <a:rPr lang="es-MX" sz="1200" dirty="0">
+                  <a:solidFill>
+                    <a:schemeClr val="tx1"/>
+                  </a:solidFill>
+                </a:rPr>
+                <a:t> </a:t>
+              </a:r>
+              <a:r>
+                <a:rPr lang="es-MX" sz="1200" b="1" dirty="0">
+                  <a:solidFill>
+                    <a:schemeClr val="tx1"/>
+                  </a:solidFill>
+                </a:rPr>
+                <a:t>del</a:t>
+              </a:r>
+              <a:r>
+                <a:rPr lang="es-MX" sz="1200" dirty="0">
+                  <a:solidFill>
+                    <a:schemeClr val="tx1"/>
+                  </a:solidFill>
+                </a:rPr>
+                <a:t> </a:t>
+              </a:r>
+              <a:r>
+                <a:rPr lang="es-MX" sz="1200" b="1" dirty="0">
+                  <a:solidFill>
+                    <a:schemeClr val="tx1"/>
+                  </a:solidFill>
+                </a:rPr>
+                <a:t>Concepto</a:t>
+              </a:r>
+            </a:p>
+          </p:txBody>
+        </p:sp>
+        <p:sp>
+          <p:nvSpPr>
+            <p:cNvPr id="21" name="5 Rectángulo">
+              <a:extLst>
+                <a:ext uri="{FF2B5EF4-FFF2-40B4-BE49-F238E27FC236}">
+                  <a16:creationId xmlns:a16="http://schemas.microsoft.com/office/drawing/2014/main" id="{DD5D8E80-DC34-490D-AA59-D6B2101FB9E5}"/>
+                </a:ext>
+              </a:extLst>
+            </p:cNvPr>
+            <p:cNvSpPr/>
+            <p:nvPr/>
+          </p:nvSpPr>
+          <p:spPr>
+            <a:xfrm>
+              <a:off x="3307277" y="5097466"/>
+              <a:ext cx="1224136" cy="648072"/>
+            </a:xfrm>
+            <a:prstGeom prst="rect">
+              <a:avLst/>
+            </a:prstGeom>
+            <a:solidFill>
+              <a:schemeClr val="bg2">
+                <a:lumMod val="75000"/>
+              </a:schemeClr>
+            </a:solidFill>
+          </p:spPr>
+          <p:style>
+            <a:lnRef idx="2">
+              <a:schemeClr val="accent1">
+                <a:shade val="50000"/>
+              </a:schemeClr>
+            </a:lnRef>
+            <a:fillRef idx="1">
+              <a:schemeClr val="accent1"/>
+            </a:fillRef>
+            <a:effectRef idx="0">
+              <a:schemeClr val="accent1"/>
+            </a:effectRef>
+            <a:fontRef idx="minor">
+              <a:schemeClr val="lt1"/>
+            </a:fontRef>
+          </p:style>
+          <p:txBody>
+            <a:bodyPr rtlCol="0" anchor="ctr"/>
+            <a:lstStyle/>
+            <a:p>
+              <a:pPr algn="ctr"/>
+              <a:r>
+                <a:rPr lang="es-MX" sz="1200" b="1" dirty="0">
+                  <a:solidFill>
+                    <a:schemeClr val="tx1"/>
+                  </a:solidFill>
+                </a:rPr>
+                <a:t>Construcción  Modelo  del Producto</a:t>
+              </a:r>
+            </a:p>
+          </p:txBody>
+        </p:sp>
+        <p:sp>
+          <p:nvSpPr>
+            <p:cNvPr id="22" name="6 Rectángulo">
+              <a:extLst>
+                <a:ext uri="{FF2B5EF4-FFF2-40B4-BE49-F238E27FC236}">
+                  <a16:creationId xmlns:a16="http://schemas.microsoft.com/office/drawing/2014/main" id="{D17DB7B4-1C29-4019-A203-E4C417C230F7}"/>
+                </a:ext>
+              </a:extLst>
+            </p:cNvPr>
+            <p:cNvSpPr/>
+            <p:nvPr/>
+          </p:nvSpPr>
+          <p:spPr>
+            <a:xfrm>
+              <a:off x="4779023" y="5097466"/>
+              <a:ext cx="1080120" cy="648072"/>
+            </a:xfrm>
+            <a:prstGeom prst="rect">
+              <a:avLst/>
+            </a:prstGeom>
+            <a:solidFill>
+              <a:schemeClr val="bg2">
+                <a:lumMod val="75000"/>
+              </a:schemeClr>
+            </a:solidFill>
+          </p:spPr>
+          <p:style>
+            <a:lnRef idx="2">
+              <a:schemeClr val="accent1">
+                <a:shade val="50000"/>
+              </a:schemeClr>
+            </a:lnRef>
+            <a:fillRef idx="1">
+              <a:schemeClr val="accent1"/>
+            </a:fillRef>
+            <a:effectRef idx="0">
+              <a:schemeClr val="accent1"/>
+            </a:effectRef>
+            <a:fontRef idx="minor">
+              <a:schemeClr val="lt1"/>
+            </a:fontRef>
+          </p:style>
+          <p:txBody>
+            <a:bodyPr rtlCol="0" anchor="ctr"/>
+            <a:lstStyle/>
+            <a:p>
+              <a:pPr algn="ctr"/>
+              <a:r>
+                <a:rPr lang="es-MX" sz="1200" b="1" dirty="0">
+                  <a:solidFill>
+                    <a:schemeClr val="tx1"/>
+                  </a:solidFill>
+                </a:rPr>
+                <a:t>Ingeniería del Producto</a:t>
+              </a:r>
+            </a:p>
+          </p:txBody>
+        </p:sp>
+        <p:sp>
+          <p:nvSpPr>
+            <p:cNvPr id="23" name="7 Rectángulo">
+              <a:extLst>
+                <a:ext uri="{FF2B5EF4-FFF2-40B4-BE49-F238E27FC236}">
+                  <a16:creationId xmlns:a16="http://schemas.microsoft.com/office/drawing/2014/main" id="{62BCB531-BD15-4D9F-A7DA-BA58936CFEB2}"/>
+                </a:ext>
+              </a:extLst>
+            </p:cNvPr>
+            <p:cNvSpPr/>
+            <p:nvPr/>
+          </p:nvSpPr>
+          <p:spPr>
+            <a:xfrm>
+              <a:off x="6106753" y="5097466"/>
+              <a:ext cx="1080120" cy="648072"/>
+            </a:xfrm>
+            <a:prstGeom prst="rect">
+              <a:avLst/>
+            </a:prstGeom>
+            <a:solidFill>
+              <a:schemeClr val="bg2">
+                <a:lumMod val="75000"/>
+              </a:schemeClr>
+            </a:solidFill>
+          </p:spPr>
+          <p:style>
+            <a:lnRef idx="2">
+              <a:schemeClr val="accent1">
+                <a:shade val="50000"/>
+              </a:schemeClr>
+            </a:lnRef>
+            <a:fillRef idx="1">
+              <a:schemeClr val="accent1"/>
+            </a:fillRef>
+            <a:effectRef idx="0">
+              <a:schemeClr val="accent1"/>
+            </a:effectRef>
+            <a:fontRef idx="minor">
+              <a:schemeClr val="lt1"/>
+            </a:fontRef>
+          </p:style>
+          <p:txBody>
+            <a:bodyPr rtlCol="0" anchor="ctr"/>
+            <a:lstStyle/>
+            <a:p>
+              <a:pPr algn="ctr"/>
+              <a:r>
+                <a:rPr lang="es-MX" sz="1200" b="1" dirty="0">
+                  <a:solidFill>
+                    <a:schemeClr val="tx1"/>
+                  </a:solidFill>
+                </a:rPr>
+                <a:t>Diseño del Proceso</a:t>
+              </a:r>
+              <a:r>
+                <a:rPr lang="es-MX" sz="1200" dirty="0"/>
+                <a:t> </a:t>
+              </a:r>
+              <a:r>
+                <a:rPr lang="es-MX" sz="1200" b="1" dirty="0">
+                  <a:solidFill>
+                    <a:schemeClr val="tx1"/>
+                  </a:solidFill>
+                </a:rPr>
+                <a:t>Industrial</a:t>
+              </a:r>
+            </a:p>
+          </p:txBody>
+        </p:sp>
+        <p:sp>
+          <p:nvSpPr>
+            <p:cNvPr id="24" name="8 Rectángulo">
+              <a:extLst>
+                <a:ext uri="{FF2B5EF4-FFF2-40B4-BE49-F238E27FC236}">
+                  <a16:creationId xmlns:a16="http://schemas.microsoft.com/office/drawing/2014/main" id="{BD0E672D-C624-433B-BF41-84E9A00A593F}"/>
+                </a:ext>
+              </a:extLst>
+            </p:cNvPr>
+            <p:cNvSpPr/>
+            <p:nvPr/>
+          </p:nvSpPr>
+          <p:spPr>
+            <a:xfrm>
+              <a:off x="7434483" y="5097466"/>
+              <a:ext cx="1224136" cy="648072"/>
+            </a:xfrm>
+            <a:prstGeom prst="rect">
+              <a:avLst/>
+            </a:prstGeom>
+            <a:solidFill>
+              <a:schemeClr val="bg2">
+                <a:lumMod val="75000"/>
+              </a:schemeClr>
+            </a:solidFill>
+          </p:spPr>
+          <p:style>
+            <a:lnRef idx="2">
+              <a:schemeClr val="accent1">
+                <a:shade val="50000"/>
+              </a:schemeClr>
+            </a:lnRef>
+            <a:fillRef idx="1">
+              <a:schemeClr val="accent1"/>
+            </a:fillRef>
+            <a:effectRef idx="0">
+              <a:schemeClr val="accent1"/>
+            </a:effectRef>
+            <a:fontRef idx="minor">
+              <a:schemeClr val="lt1"/>
+            </a:fontRef>
+          </p:style>
+          <p:txBody>
+            <a:bodyPr rtlCol="0" anchor="ctr"/>
+            <a:lstStyle/>
+            <a:p>
+              <a:pPr algn="ctr"/>
+              <a:r>
+                <a:rPr lang="es-MX" sz="1200" b="1" dirty="0">
+                  <a:solidFill>
+                    <a:schemeClr val="tx1"/>
+                  </a:solidFill>
+                </a:rPr>
+                <a:t>Diseño para Construcción del</a:t>
+              </a:r>
+              <a:r>
+                <a:rPr lang="es-MX" sz="1200" dirty="0"/>
+                <a:t> </a:t>
+              </a:r>
+              <a:r>
+                <a:rPr lang="es-MX" sz="1200" b="1" dirty="0">
+                  <a:solidFill>
+                    <a:schemeClr val="tx1"/>
+                  </a:solidFill>
+                </a:rPr>
+                <a:t>Producto</a:t>
+              </a:r>
+            </a:p>
+          </p:txBody>
+        </p:sp>
+      </p:grpSp>
+    </p:spTree>
+    <p:extLst>
+      <p:ext uri="{BB962C8B-B14F-4D97-AF65-F5344CB8AC3E}">
+        <p14:creationId xmlns:p14="http://schemas.microsoft.com/office/powerpoint/2010/main" val="3447285602"/>
+      </p:ext>
+    </p:extLst>
+  </p:cSld>
+  <p:clrMapOvr>
+    <a:masterClrMapping/>
+  </p:clrMapOvr>
+</p:sld>
+</file>
+
 <file path=ppt/theme/theme1.xml><?xml version="1.0" encoding="utf-8"?>
 <a:theme xmlns:a="http://schemas.openxmlformats.org/drawingml/2006/main" name="Circuito">
   <a:themeElements>

</xml_diff>